<commit_message>
Updated Eigenvalues and vectors
</commit_message>
<xml_diff>
--- a/Unit 3-4 Definitions.pptx
+++ b/Unit 3-4 Definitions.pptx
@@ -36,7 +36,7 @@
     <p:sldId id="289" r:id="rId30"/>
     <p:sldId id="290" r:id="rId31"/>
     <p:sldId id="280" r:id="rId32"/>
-    <p:sldId id="281" r:id="rId33"/>
+    <p:sldId id="294" r:id="rId33"/>
     <p:sldId id="291" r:id="rId34"/>
   </p:sldIdLst>
   <p:sldSz cx="12192000" cy="6858000"/>
@@ -159,7 +159,7 @@
 <file path=ppt/revisionInfo.xml><?xml version="1.0" encoding="utf-8"?>
 <p1510:revInfo xmlns:a="http://schemas.openxmlformats.org/drawingml/2006/main" xmlns:r="http://schemas.openxmlformats.org/officeDocument/2006/relationships" xmlns:p1510="http://schemas.microsoft.com/office/powerpoint/2015/10/main">
   <p1510:revLst>
-    <p1510:client id="{36668F78-20BC-4003-801C-8ACC5A4B6E0B}" v="53" dt="2021-03-20T19:46:25.548"/>
+    <p1510:client id="{36668F78-20BC-4003-801C-8ACC5A4B6E0B}" v="55" dt="2021-03-21T23:37:49.914"/>
   </p1510:revLst>
 </p1510:revInfo>
 </file>
@@ -169,7 +169,7 @@
   <pc:docChgLst>
     <pc:chgData name="Chen, Jeff" userId="9a3224f5-9893-4468-acd0-6d03119f890b" providerId="ADAL" clId="{36668F78-20BC-4003-801C-8ACC5A4B6E0B}"/>
     <pc:docChg chg="undo custSel addSld delSld modSld">
-      <pc:chgData name="Chen, Jeff" userId="9a3224f5-9893-4468-acd0-6d03119f890b" providerId="ADAL" clId="{36668F78-20BC-4003-801C-8ACC5A4B6E0B}" dt="2021-03-20T19:59:52.374" v="1623" actId="478"/>
+      <pc:chgData name="Chen, Jeff" userId="9a3224f5-9893-4468-acd0-6d03119f890b" providerId="ADAL" clId="{36668F78-20BC-4003-801C-8ACC5A4B6E0B}" dt="2021-03-21T23:38:02.781" v="1663" actId="2696"/>
       <pc:docMkLst>
         <pc:docMk/>
       </pc:docMkLst>
@@ -1201,8 +1201,8 @@
           </ac:cxnSpMkLst>
         </pc:cxnChg>
       </pc:sldChg>
-      <pc:sldChg chg="addSp modSp new mod setBg">
-        <pc:chgData name="Chen, Jeff" userId="9a3224f5-9893-4468-acd0-6d03119f890b" providerId="ADAL" clId="{36668F78-20BC-4003-801C-8ACC5A4B6E0B}" dt="2021-03-20T19:59:13.837" v="1617" actId="1076"/>
+      <pc:sldChg chg="addSp modSp new del mod setBg">
+        <pc:chgData name="Chen, Jeff" userId="9a3224f5-9893-4468-acd0-6d03119f890b" providerId="ADAL" clId="{36668F78-20BC-4003-801C-8ACC5A4B6E0B}" dt="2021-03-21T23:37:38.278" v="1643" actId="2696"/>
         <pc:sldMkLst>
           <pc:docMk/>
           <pc:sldMk cId="1278481759" sldId="281"/>
@@ -1728,13 +1728,13 @@
         </pc:picChg>
       </pc:sldChg>
       <pc:sldChg chg="addSp delSp modSp new mod setBg">
-        <pc:chgData name="Chen, Jeff" userId="9a3224f5-9893-4468-acd0-6d03119f890b" providerId="ADAL" clId="{36668F78-20BC-4003-801C-8ACC5A4B6E0B}" dt="2021-03-20T19:59:52.374" v="1623" actId="478"/>
+        <pc:chgData name="Chen, Jeff" userId="9a3224f5-9893-4468-acd0-6d03119f890b" providerId="ADAL" clId="{36668F78-20BC-4003-801C-8ACC5A4B6E0B}" dt="2021-03-21T23:37:02.903" v="1641" actId="1076"/>
         <pc:sldMkLst>
           <pc:docMk/>
           <pc:sldMk cId="1873168933" sldId="291"/>
         </pc:sldMkLst>
         <pc:spChg chg="mod">
-          <ac:chgData name="Chen, Jeff" userId="9a3224f5-9893-4468-acd0-6d03119f890b" providerId="ADAL" clId="{36668F78-20BC-4003-801C-8ACC5A4B6E0B}" dt="2021-03-20T19:59:40.148" v="1622" actId="26606"/>
+          <ac:chgData name="Chen, Jeff" userId="9a3224f5-9893-4468-acd0-6d03119f890b" providerId="ADAL" clId="{36668F78-20BC-4003-801C-8ACC5A4B6E0B}" dt="2021-03-21T23:36:59.939" v="1639" actId="20577"/>
           <ac:spMkLst>
             <pc:docMk/>
             <pc:sldMk cId="1873168933" sldId="291"/>
@@ -1765,6 +1765,14 @@
             <ac:spMk id="16" creationId="{7F57BEA8-497D-4AA8-8A18-BDCD696B25FE}"/>
           </ac:spMkLst>
         </pc:spChg>
+        <pc:picChg chg="add mod">
+          <ac:chgData name="Chen, Jeff" userId="9a3224f5-9893-4468-acd0-6d03119f890b" providerId="ADAL" clId="{36668F78-20BC-4003-801C-8ACC5A4B6E0B}" dt="2021-03-21T23:37:02.903" v="1641" actId="1076"/>
+          <ac:picMkLst>
+            <pc:docMk/>
+            <pc:sldMk cId="1873168933" sldId="291"/>
+            <ac:picMk id="4" creationId="{58535C4F-9E18-47DC-A559-1AF53A981F4B}"/>
+          </ac:picMkLst>
+        </pc:picChg>
         <pc:picChg chg="add del mod">
           <ac:chgData name="Chen, Jeff" userId="9a3224f5-9893-4468-acd0-6d03119f890b" providerId="ADAL" clId="{36668F78-20BC-4003-801C-8ACC5A4B6E0B}" dt="2021-03-20T19:59:52.374" v="1623" actId="478"/>
           <ac:picMkLst>
@@ -1805,12 +1813,65 @@
           <pc:sldMk cId="2513259099" sldId="291"/>
         </pc:sldMkLst>
       </pc:sldChg>
+      <pc:sldChg chg="new del">
+        <pc:chgData name="Chen, Jeff" userId="9a3224f5-9893-4468-acd0-6d03119f890b" providerId="ADAL" clId="{36668F78-20BC-4003-801C-8ACC5A4B6E0B}" dt="2021-03-21T23:38:02.781" v="1663" actId="2696"/>
+        <pc:sldMkLst>
+          <pc:docMk/>
+          <pc:sldMk cId="2135091753" sldId="292"/>
+        </pc:sldMkLst>
+      </pc:sldChg>
       <pc:sldChg chg="add del">
         <pc:chgData name="Chen, Jeff" userId="9a3224f5-9893-4468-acd0-6d03119f890b" providerId="ADAL" clId="{36668F78-20BC-4003-801C-8ACC5A4B6E0B}" dt="2021-03-20T19:46:51.458" v="1530" actId="47"/>
         <pc:sldMkLst>
           <pc:docMk/>
           <pc:sldMk cId="2799505585" sldId="292"/>
         </pc:sldMkLst>
+      </pc:sldChg>
+      <pc:sldChg chg="addSp delSp modSp new del mod">
+        <pc:chgData name="Chen, Jeff" userId="9a3224f5-9893-4468-acd0-6d03119f890b" providerId="ADAL" clId="{36668F78-20BC-4003-801C-8ACC5A4B6E0B}" dt="2021-03-21T23:38:00.791" v="1662" actId="2696"/>
+        <pc:sldMkLst>
+          <pc:docMk/>
+          <pc:sldMk cId="1080013906" sldId="293"/>
+        </pc:sldMkLst>
+        <pc:picChg chg="add del mod">
+          <ac:chgData name="Chen, Jeff" userId="9a3224f5-9893-4468-acd0-6d03119f890b" providerId="ADAL" clId="{36668F78-20BC-4003-801C-8ACC5A4B6E0B}" dt="2021-03-21T23:37:45.107" v="1646" actId="478"/>
+          <ac:picMkLst>
+            <pc:docMk/>
+            <pc:sldMk cId="1080013906" sldId="293"/>
+            <ac:picMk id="3" creationId="{7F828039-FCF8-443D-817D-38AE3F40CC78}"/>
+          </ac:picMkLst>
+        </pc:picChg>
+      </pc:sldChg>
+      <pc:sldChg chg="addSp delSp modSp add mod">
+        <pc:chgData name="Chen, Jeff" userId="9a3224f5-9893-4468-acd0-6d03119f890b" providerId="ADAL" clId="{36668F78-20BC-4003-801C-8ACC5A4B6E0B}" dt="2021-03-21T23:37:56.620" v="1661" actId="20577"/>
+        <pc:sldMkLst>
+          <pc:docMk/>
+          <pc:sldMk cId="1543148251" sldId="294"/>
+        </pc:sldMkLst>
+        <pc:spChg chg="mod">
+          <ac:chgData name="Chen, Jeff" userId="9a3224f5-9893-4468-acd0-6d03119f890b" providerId="ADAL" clId="{36668F78-20BC-4003-801C-8ACC5A4B6E0B}" dt="2021-03-21T23:37:56.620" v="1661" actId="20577"/>
+          <ac:spMkLst>
+            <pc:docMk/>
+            <pc:sldMk cId="1543148251" sldId="294"/>
+            <ac:spMk id="2" creationId="{D6CC1811-68D8-45EB-809A-07E60D9F7B18}"/>
+          </ac:spMkLst>
+        </pc:spChg>
+        <pc:picChg chg="del">
+          <ac:chgData name="Chen, Jeff" userId="9a3224f5-9893-4468-acd0-6d03119f890b" providerId="ADAL" clId="{36668F78-20BC-4003-801C-8ACC5A4B6E0B}" dt="2021-03-21T23:37:49.631" v="1648" actId="478"/>
+          <ac:picMkLst>
+            <pc:docMk/>
+            <pc:sldMk cId="1543148251" sldId="294"/>
+            <ac:picMk id="4" creationId="{0025ECA8-7F88-454B-9422-DACF137FB241}"/>
+          </ac:picMkLst>
+        </pc:picChg>
+        <pc:picChg chg="add mod">
+          <ac:chgData name="Chen, Jeff" userId="9a3224f5-9893-4468-acd0-6d03119f890b" providerId="ADAL" clId="{36668F78-20BC-4003-801C-8ACC5A4B6E0B}" dt="2021-03-21T23:37:52.682" v="1650" actId="1076"/>
+          <ac:picMkLst>
+            <pc:docMk/>
+            <pc:sldMk cId="1543148251" sldId="294"/>
+            <ac:picMk id="8" creationId="{9E07FB79-C622-460B-A0CF-86A584CEE794}"/>
+          </ac:picMkLst>
+        </pc:picChg>
       </pc:sldChg>
     </pc:docChg>
   </pc:docChgLst>
@@ -1899,7 +1960,7 @@
           <a:p>
             <a:fld id="{64FCA671-C320-437E-A846-70FE3A79CD3C}" type="datetimeFigureOut">
               <a:rPr lang="en-US" smtClean="0"/>
-              <a:t>3/20/2021</a:t>
+              <a:t>3/21/2021</a:t>
             </a:fld>
             <a:endParaRPr lang="en-US"/>
           </a:p>
@@ -2313,7 +2374,7 @@
           <a:p>
             <a:fld id="{30D69E17-F306-4E08-9522-67EEF85B89F0}" type="datetimeFigureOut">
               <a:rPr lang="en-US" smtClean="0"/>
-              <a:t>3/20/2021</a:t>
+              <a:t>3/21/2021</a:t>
             </a:fld>
             <a:endParaRPr lang="en-US"/>
           </a:p>
@@ -2511,7 +2572,7 @@
           <a:p>
             <a:fld id="{30D69E17-F306-4E08-9522-67EEF85B89F0}" type="datetimeFigureOut">
               <a:rPr lang="en-US" smtClean="0"/>
-              <a:t>3/20/2021</a:t>
+              <a:t>3/21/2021</a:t>
             </a:fld>
             <a:endParaRPr lang="en-US"/>
           </a:p>
@@ -2719,7 +2780,7 @@
           <a:p>
             <a:fld id="{30D69E17-F306-4E08-9522-67EEF85B89F0}" type="datetimeFigureOut">
               <a:rPr lang="en-US" smtClean="0"/>
-              <a:t>3/20/2021</a:t>
+              <a:t>3/21/2021</a:t>
             </a:fld>
             <a:endParaRPr lang="en-US"/>
           </a:p>
@@ -2917,7 +2978,7 @@
           <a:p>
             <a:fld id="{30D69E17-F306-4E08-9522-67EEF85B89F0}" type="datetimeFigureOut">
               <a:rPr lang="en-US" smtClean="0"/>
-              <a:t>3/20/2021</a:t>
+              <a:t>3/21/2021</a:t>
             </a:fld>
             <a:endParaRPr lang="en-US"/>
           </a:p>
@@ -3192,7 +3253,7 @@
           <a:p>
             <a:fld id="{30D69E17-F306-4E08-9522-67EEF85B89F0}" type="datetimeFigureOut">
               <a:rPr lang="en-US" smtClean="0"/>
-              <a:t>3/20/2021</a:t>
+              <a:t>3/21/2021</a:t>
             </a:fld>
             <a:endParaRPr lang="en-US"/>
           </a:p>
@@ -3457,7 +3518,7 @@
           <a:p>
             <a:fld id="{30D69E17-F306-4E08-9522-67EEF85B89F0}" type="datetimeFigureOut">
               <a:rPr lang="en-US" smtClean="0"/>
-              <a:t>3/20/2021</a:t>
+              <a:t>3/21/2021</a:t>
             </a:fld>
             <a:endParaRPr lang="en-US"/>
           </a:p>
@@ -3869,7 +3930,7 @@
           <a:p>
             <a:fld id="{30D69E17-F306-4E08-9522-67EEF85B89F0}" type="datetimeFigureOut">
               <a:rPr lang="en-US" smtClean="0"/>
-              <a:t>3/20/2021</a:t>
+              <a:t>3/21/2021</a:t>
             </a:fld>
             <a:endParaRPr lang="en-US"/>
           </a:p>
@@ -4010,7 +4071,7 @@
           <a:p>
             <a:fld id="{30D69E17-F306-4E08-9522-67EEF85B89F0}" type="datetimeFigureOut">
               <a:rPr lang="en-US" smtClean="0"/>
-              <a:t>3/20/2021</a:t>
+              <a:t>3/21/2021</a:t>
             </a:fld>
             <a:endParaRPr lang="en-US"/>
           </a:p>
@@ -4123,7 +4184,7 @@
           <a:p>
             <a:fld id="{30D69E17-F306-4E08-9522-67EEF85B89F0}" type="datetimeFigureOut">
               <a:rPr lang="en-US" smtClean="0"/>
-              <a:t>3/20/2021</a:t>
+              <a:t>3/21/2021</a:t>
             </a:fld>
             <a:endParaRPr lang="en-US"/>
           </a:p>
@@ -4434,7 +4495,7 @@
           <a:p>
             <a:fld id="{30D69E17-F306-4E08-9522-67EEF85B89F0}" type="datetimeFigureOut">
               <a:rPr lang="en-US" smtClean="0"/>
-              <a:t>3/20/2021</a:t>
+              <a:t>3/21/2021</a:t>
             </a:fld>
             <a:endParaRPr lang="en-US"/>
           </a:p>
@@ -4722,7 +4783,7 @@
           <a:p>
             <a:fld id="{30D69E17-F306-4E08-9522-67EEF85B89F0}" type="datetimeFigureOut">
               <a:rPr lang="en-US" smtClean="0"/>
-              <a:t>3/20/2021</a:t>
+              <a:t>3/21/2021</a:t>
             </a:fld>
             <a:endParaRPr lang="en-US"/>
           </a:p>
@@ -4963,7 +5024,7 @@
           <a:p>
             <a:fld id="{30D69E17-F306-4E08-9522-67EEF85B89F0}" type="datetimeFigureOut">
               <a:rPr lang="en-US" smtClean="0"/>
-              <a:t>3/20/2021</a:t>
+              <a:t>3/21/2021</a:t>
             </a:fld>
             <a:endParaRPr lang="en-US"/>
           </a:p>
@@ -15739,12 +15800,67 @@
           <a:chExt cx="0" cy="0"/>
         </a:xfrm>
       </p:grpSpPr>
+      <p:cxnSp>
+        <p:nvCxnSpPr>
+          <p:cNvPr id="12" name="Straight Connector 8">
+            <a:extLst>
+              <a:ext uri="{FF2B5EF4-FFF2-40B4-BE49-F238E27FC236}">
+                <a16:creationId xmlns:a16="http://schemas.microsoft.com/office/drawing/2014/main" id="{D2E961F1-4A28-4A5F-BBD4-6E400E5E6C75}"/>
+              </a:ext>
+              <a:ext uri="{C183D7F6-B498-43B3-948B-1728B52AA6E4}">
+                <adec:decorative xmlns:adec="http://schemas.microsoft.com/office/drawing/2017/decorative" val="1"/>
+              </a:ext>
+            </a:extLst>
+          </p:cNvPr>
+          <p:cNvCxnSpPr>
+            <a:cxnSpLocks noGrp="1" noRot="1" noChangeAspect="1" noMove="1" noResize="1" noEditPoints="1" noAdjustHandles="1" noChangeArrowheads="1" noChangeShapeType="1"/>
+          </p:cNvCxnSpPr>
+          <p:nvPr>
+            <p:extLst>
+              <p:ext uri="{386F3935-93C4-4BCD-93E2-E3B085C9AB24}">
+                <p16:designElem xmlns:p16="http://schemas.microsoft.com/office/powerpoint/2015/main" val="1"/>
+              </p:ext>
+            </p:extLst>
+          </p:nvPr>
+        </p:nvCxnSpPr>
+        <p:spPr bwMode="white">
+          <a:xfrm>
+            <a:off x="0" y="272357"/>
+            <a:ext cx="12188824" cy="0"/>
+          </a:xfrm>
+          <a:prstGeom prst="line">
+            <a:avLst/>
+          </a:prstGeom>
+          <a:ln w="50800">
+            <a:solidFill>
+              <a:schemeClr val="tx1">
+                <a:lumMod val="75000"/>
+                <a:lumOff val="25000"/>
+              </a:schemeClr>
+            </a:solidFill>
+          </a:ln>
+        </p:spPr>
+        <p:style>
+          <a:lnRef idx="1">
+            <a:schemeClr val="accent1"/>
+          </a:lnRef>
+          <a:fillRef idx="0">
+            <a:schemeClr val="accent1"/>
+          </a:fillRef>
+          <a:effectRef idx="0">
+            <a:schemeClr val="accent1"/>
+          </a:effectRef>
+          <a:fontRef idx="minor">
+            <a:schemeClr val="tx1"/>
+          </a:fontRef>
+        </p:style>
+      </p:cxnSp>
       <p:sp>
         <p:nvSpPr>
-          <p:cNvPr id="9" name="Rectangle 8">
-            <a:extLst>
-              <a:ext uri="{FF2B5EF4-FFF2-40B4-BE49-F238E27FC236}">
-                <a16:creationId xmlns:a16="http://schemas.microsoft.com/office/drawing/2014/main" id="{1045B59B-615E-4718-A150-42DE5D03E1C8}"/>
+          <p:cNvPr id="11" name="Rectangle 10">
+            <a:extLst>
+              <a:ext uri="{FF2B5EF4-FFF2-40B4-BE49-F238E27FC236}">
+                <a16:creationId xmlns:a16="http://schemas.microsoft.com/office/drawing/2014/main" id="{7F57BEA8-497D-4AA8-8A18-BDCD696B25FE}"/>
               </a:ext>
               <a:ext uri="{C183D7F6-B498-43B3-948B-1728B52AA6E4}">
                 <adec:decorative xmlns:adec="http://schemas.microsoft.com/office/drawing/2017/decorative" val="1"/>
@@ -15764,14 +15880,17 @@
         </p:nvSpPr>
         <p:spPr>
           <a:xfrm>
-            <a:off x="0" y="0"/>
-            <a:ext cx="12192000" cy="6858000"/>
+            <a:off x="0" y="368596"/>
+            <a:ext cx="12192000" cy="1735555"/>
           </a:xfrm>
           <a:prstGeom prst="rect">
             <a:avLst/>
           </a:prstGeom>
           <a:solidFill>
-            <a:srgbClr val="FFFFFF"/>
+            <a:schemeClr val="tx1">
+              <a:lumMod val="75000"/>
+              <a:lumOff val="25000"/>
+            </a:schemeClr>
           </a:solidFill>
           <a:ln>
             <a:noFill/>
@@ -15804,73 +15923,10 @@
       </p:sp>
       <p:sp>
         <p:nvSpPr>
-          <p:cNvPr id="11" name="Rectangle 10">
-            <a:extLst>
-              <a:ext uri="{FF2B5EF4-FFF2-40B4-BE49-F238E27FC236}">
-                <a16:creationId xmlns:a16="http://schemas.microsoft.com/office/drawing/2014/main" id="{D6CF29CD-38B8-4924-BA11-6D60517487EF}"/>
-              </a:ext>
-              <a:ext uri="{C183D7F6-B498-43B3-948B-1728B52AA6E4}">
-                <adec:decorative xmlns:adec="http://schemas.microsoft.com/office/drawing/2017/decorative" val="1"/>
-              </a:ext>
-            </a:extLst>
-          </p:cNvPr>
-          <p:cNvSpPr>
-            <a:spLocks noGrp="1" noRot="1" noChangeAspect="1" noMove="1" noResize="1" noEditPoints="1" noAdjustHandles="1" noChangeArrowheads="1" noChangeShapeType="1" noTextEdit="1"/>
-          </p:cNvSpPr>
-          <p:nvPr>
-            <p:extLst>
-              <p:ext uri="{386F3935-93C4-4BCD-93E2-E3B085C9AB24}">
-                <p16:designElem xmlns:p16="http://schemas.microsoft.com/office/powerpoint/2015/main" val="1"/>
-              </p:ext>
-            </p:extLst>
-          </p:nvPr>
-        </p:nvSpPr>
-        <p:spPr>
-          <a:xfrm>
-            <a:off x="0" y="0"/>
-            <a:ext cx="12192000" cy="2615184"/>
-          </a:xfrm>
-          <a:prstGeom prst="rect">
-            <a:avLst/>
-          </a:prstGeom>
-          <a:solidFill>
-            <a:srgbClr val="404040"/>
-          </a:solidFill>
-          <a:ln>
-            <a:noFill/>
-          </a:ln>
-        </p:spPr>
-        <p:style>
-          <a:lnRef idx="2">
-            <a:schemeClr val="accent1">
-              <a:shade val="50000"/>
-            </a:schemeClr>
-          </a:lnRef>
-          <a:fillRef idx="1">
-            <a:schemeClr val="accent1"/>
-          </a:fillRef>
-          <a:effectRef idx="0">
-            <a:schemeClr val="accent1"/>
-          </a:effectRef>
-          <a:fontRef idx="minor">
-            <a:schemeClr val="lt1"/>
-          </a:fontRef>
-        </p:style>
-        <p:txBody>
-          <a:bodyPr rtlCol="0" anchor="ctr"/>
-          <a:lstStyle/>
-          <a:p>
-            <a:pPr algn="ctr"/>
-            <a:endParaRPr lang="en-US"/>
-          </a:p>
-        </p:txBody>
-      </p:sp>
-      <p:sp>
-        <p:nvSpPr>
           <p:cNvPr id="2" name="Title 1">
             <a:extLst>
               <a:ext uri="{FF2B5EF4-FFF2-40B4-BE49-F238E27FC236}">
-                <a16:creationId xmlns:a16="http://schemas.microsoft.com/office/drawing/2014/main" id="{FAC7198A-9916-43EA-AC07-149C5F052B8E}"/>
+                <a16:creationId xmlns:a16="http://schemas.microsoft.com/office/drawing/2014/main" id="{D6CC1811-68D8-45EB-809A-07E60D9F7B18}"/>
               </a:ext>
             </a:extLst>
           </p:cNvPr>
@@ -15883,8 +15939,8 @@
         </p:nvSpPr>
         <p:spPr>
           <a:xfrm>
-            <a:off x="707011" y="365760"/>
-            <a:ext cx="10765410" cy="1207269"/>
+            <a:off x="526073" y="489439"/>
+            <a:ext cx="11139854" cy="930447"/>
           </a:xfrm>
         </p:spPr>
         <p:txBody>
@@ -15895,9 +15951,9 @@
           <a:p>
             <a:pPr algn="ctr"/>
             <a:r>
-              <a:rPr lang="en-US" sz="6000" kern="1200" dirty="0">
+              <a:rPr lang="en-US" sz="5400" kern="1200" dirty="0">
                 <a:solidFill>
-                  <a:srgbClr val="FFFFFF"/>
+                  <a:schemeClr val="bg1"/>
                 </a:solidFill>
                 <a:latin typeface="+mj-lt"/>
                 <a:ea typeface="+mj-ea"/>
@@ -15908,12 +15964,121 @@
           </a:p>
         </p:txBody>
       </p:sp>
+      <p:cxnSp>
+        <p:nvCxnSpPr>
+          <p:cNvPr id="13" name="Straight Connector 12">
+            <a:extLst>
+              <a:ext uri="{FF2B5EF4-FFF2-40B4-BE49-F238E27FC236}">
+                <a16:creationId xmlns:a16="http://schemas.microsoft.com/office/drawing/2014/main" id="{A82415D3-DDE5-4D63-8CB3-23A5EC581B27}"/>
+              </a:ext>
+              <a:ext uri="{C183D7F6-B498-43B3-948B-1728B52AA6E4}">
+                <adec:decorative xmlns:adec="http://schemas.microsoft.com/office/drawing/2017/decorative" val="1"/>
+              </a:ext>
+            </a:extLst>
+          </p:cNvPr>
+          <p:cNvCxnSpPr>
+            <a:cxnSpLocks noGrp="1" noRot="1" noChangeAspect="1" noMove="1" noResize="1" noEditPoints="1" noAdjustHandles="1" noChangeArrowheads="1" noChangeShapeType="1"/>
+          </p:cNvCxnSpPr>
+          <p:nvPr>
+            <p:extLst>
+              <p:ext uri="{386F3935-93C4-4BCD-93E2-E3B085C9AB24}">
+                <p16:designElem xmlns:p16="http://schemas.microsoft.com/office/powerpoint/2015/main" val="1"/>
+              </p:ext>
+            </p:extLst>
+          </p:nvPr>
+        </p:nvCxnSpPr>
+        <p:spPr>
+          <a:xfrm>
+            <a:off x="4724400" y="1479733"/>
+            <a:ext cx="2743200" cy="0"/>
+          </a:xfrm>
+          <a:prstGeom prst="line">
+            <a:avLst/>
+          </a:prstGeom>
+          <a:ln w="19050">
+            <a:solidFill>
+              <a:schemeClr val="bg1">
+                <a:alpha val="75000"/>
+              </a:schemeClr>
+            </a:solidFill>
+          </a:ln>
+        </p:spPr>
+        <p:style>
+          <a:lnRef idx="1">
+            <a:schemeClr val="accent1"/>
+          </a:lnRef>
+          <a:fillRef idx="0">
+            <a:schemeClr val="accent1"/>
+          </a:fillRef>
+          <a:effectRef idx="0">
+            <a:schemeClr val="accent1"/>
+          </a:effectRef>
+          <a:fontRef idx="minor">
+            <a:schemeClr val="tx1"/>
+          </a:fontRef>
+        </p:style>
+      </p:cxnSp>
+      <p:cxnSp>
+        <p:nvCxnSpPr>
+          <p:cNvPr id="15" name="Straight Connector 14">
+            <a:extLst>
+              <a:ext uri="{FF2B5EF4-FFF2-40B4-BE49-F238E27FC236}">
+                <a16:creationId xmlns:a16="http://schemas.microsoft.com/office/drawing/2014/main" id="{AD7193FB-6AE6-4B3B-8F89-56B55DD63B4D}"/>
+              </a:ext>
+              <a:ext uri="{C183D7F6-B498-43B3-948B-1728B52AA6E4}">
+                <adec:decorative xmlns:adec="http://schemas.microsoft.com/office/drawing/2017/decorative" val="1"/>
+              </a:ext>
+            </a:extLst>
+          </p:cNvPr>
+          <p:cNvCxnSpPr>
+            <a:cxnSpLocks noGrp="1" noRot="1" noChangeAspect="1" noMove="1" noResize="1" noEditPoints="1" noAdjustHandles="1" noChangeArrowheads="1" noChangeShapeType="1"/>
+          </p:cNvCxnSpPr>
+          <p:nvPr>
+            <p:extLst>
+              <p:ext uri="{386F3935-93C4-4BCD-93E2-E3B085C9AB24}">
+                <p16:designElem xmlns:p16="http://schemas.microsoft.com/office/powerpoint/2015/main" val="1"/>
+              </p:ext>
+            </p:extLst>
+          </p:nvPr>
+        </p:nvCxnSpPr>
+        <p:spPr bwMode="white">
+          <a:xfrm>
+            <a:off x="0" y="2201402"/>
+            <a:ext cx="12188824" cy="0"/>
+          </a:xfrm>
+          <a:prstGeom prst="line">
+            <a:avLst/>
+          </a:prstGeom>
+          <a:ln w="50800">
+            <a:solidFill>
+              <a:schemeClr val="tx1">
+                <a:lumMod val="75000"/>
+                <a:lumOff val="25000"/>
+              </a:schemeClr>
+            </a:solidFill>
+          </a:ln>
+        </p:spPr>
+        <p:style>
+          <a:lnRef idx="1">
+            <a:schemeClr val="accent1"/>
+          </a:lnRef>
+          <a:fillRef idx="0">
+            <a:schemeClr val="accent1"/>
+          </a:fillRef>
+          <a:effectRef idx="0">
+            <a:schemeClr val="accent1"/>
+          </a:effectRef>
+          <a:fontRef idx="minor">
+            <a:schemeClr val="tx1"/>
+          </a:fontRef>
+        </p:style>
+      </p:cxnSp>
       <p:pic>
         <p:nvPicPr>
-          <p:cNvPr id="4" name="Picture 3">
-            <a:extLst>
-              <a:ext uri="{FF2B5EF4-FFF2-40B4-BE49-F238E27FC236}">
-                <a16:creationId xmlns:a16="http://schemas.microsoft.com/office/drawing/2014/main" id="{23385CA5-1984-450A-BA69-6B2CE687E97C}"/>
+          <p:cNvPr id="8" name="Picture 7">
+            <a:extLst>
+              <a:ext uri="{FF2B5EF4-FFF2-40B4-BE49-F238E27FC236}">
+                <a16:creationId xmlns:a16="http://schemas.microsoft.com/office/drawing/2014/main" id="{9E07FB79-C622-460B-A0CF-86A584CEE794}"/>
               </a:ext>
             </a:extLst>
           </p:cNvPr>
@@ -15930,7 +16095,7 @@
         </p:blipFill>
         <p:spPr>
           <a:xfrm>
-            <a:off x="638980" y="4242817"/>
+            <a:off x="643676" y="3755137"/>
             <a:ext cx="10901471" cy="1335429"/>
           </a:xfrm>
           <a:prstGeom prst="rect">
@@ -15941,7 +16106,7 @@
     </p:spTree>
     <p:extLst>
       <p:ext uri="{BB962C8B-B14F-4D97-AF65-F5344CB8AC3E}">
-        <p14:creationId xmlns:p14="http://schemas.microsoft.com/office/powerpoint/2010/main" val="1278481759"/>
+        <p14:creationId xmlns:p14="http://schemas.microsoft.com/office/powerpoint/2010/main" val="1543148251"/>
       </p:ext>
     </p:extLst>
   </p:cSld>
@@ -16640,14 +16805,17 @@
           <a:lstStyle/>
           <a:p>
             <a:pPr algn="ctr"/>
-            <a:endParaRPr lang="en-US" sz="5400" kern="1200" dirty="0">
-              <a:solidFill>
-                <a:schemeClr val="bg1"/>
-              </a:solidFill>
-              <a:latin typeface="+mj-lt"/>
-              <a:ea typeface="+mj-ea"/>
-              <a:cs typeface="+mj-cs"/>
-            </a:endParaRPr>
+            <a:r>
+              <a:rPr lang="en-US" sz="5400" kern="1200" dirty="0">
+                <a:solidFill>
+                  <a:schemeClr val="bg1"/>
+                </a:solidFill>
+                <a:latin typeface="+mj-lt"/>
+                <a:ea typeface="+mj-ea"/>
+                <a:cs typeface="+mj-cs"/>
+              </a:rPr>
+              <a:t>Eigenspace</a:t>
+            </a:r>
           </a:p>
         </p:txBody>
       </p:sp>
@@ -16760,6 +16928,36 @@
           </a:fontRef>
         </p:style>
       </p:cxnSp>
+      <p:pic>
+        <p:nvPicPr>
+          <p:cNvPr id="4" name="Picture 3">
+            <a:extLst>
+              <a:ext uri="{FF2B5EF4-FFF2-40B4-BE49-F238E27FC236}">
+                <a16:creationId xmlns:a16="http://schemas.microsoft.com/office/drawing/2014/main" id="{58535C4F-9E18-47DC-A559-1AF53A981F4B}"/>
+              </a:ext>
+            </a:extLst>
+          </p:cNvPr>
+          <p:cNvPicPr>
+            <a:picLocks noChangeAspect="1"/>
+          </p:cNvPicPr>
+          <p:nvPr/>
+        </p:nvPicPr>
+        <p:blipFill>
+          <a:blip r:embed="rId2"/>
+          <a:stretch>
+            <a:fillRect/>
+          </a:stretch>
+        </p:blipFill>
+        <p:spPr>
+          <a:xfrm>
+            <a:off x="1331912" y="2564789"/>
+            <a:ext cx="9525000" cy="2924175"/>
+          </a:xfrm>
+          <a:prstGeom prst="rect">
+            <a:avLst/>
+          </a:prstGeom>
+        </p:spPr>
+      </p:pic>
     </p:spTree>
     <p:extLst>
       <p:ext uri="{BB962C8B-B14F-4D97-AF65-F5344CB8AC3E}">
@@ -20230,6 +20428,12 @@
 </file>
 
 <file path=customXml/item2.xml><?xml version="1.0" encoding="utf-8"?>
+<p:properties xmlns:p="http://schemas.microsoft.com/office/2006/metadata/properties" xmlns:xsi="http://www.w3.org/2001/XMLSchema-instance" xmlns:pc="http://schemas.microsoft.com/office/infopath/2007/PartnerControls">
+  <documentManagement/>
+</p:properties>
+</file>
+
+<file path=customXml/item3.xml><?xml version="1.0" encoding="utf-8"?>
 <ct:contentTypeSchema xmlns:ct="http://schemas.microsoft.com/office/2006/metadata/contentType" xmlns:ma="http://schemas.microsoft.com/office/2006/metadata/properties/metaAttributes" ct:_="" ma:_="" ma:contentTypeName="Document" ma:contentTypeID="0x010100C7DE497FA346CD49B765B54AB6A367B5" ma:contentTypeVersion="4" ma:contentTypeDescription="Create a new document." ma:contentTypeScope="" ma:versionID="a3a5beb513839eaa00abdd1d143a0caa">
   <xsd:schema xmlns:xsd="http://www.w3.org/2001/XMLSchema" xmlns:xs="http://www.w3.org/2001/XMLSchema" xmlns:p="http://schemas.microsoft.com/office/2006/metadata/properties" xmlns:ns3="d9c5c803-e33e-4c61-8351-da4c9b99ae39" targetNamespace="http://schemas.microsoft.com/office/2006/metadata/properties" ma:root="true" ma:fieldsID="d1dcafc5a49a936c7c338c09e0f70733" ns3:_="">
     <xsd:import namespace="d9c5c803-e33e-4c61-8351-da4c9b99ae39"/>
@@ -20375,12 +20579,6 @@
 </ct:contentTypeSchema>
 </file>
 
-<file path=customXml/item3.xml><?xml version="1.0" encoding="utf-8"?>
-<p:properties xmlns:p="http://schemas.microsoft.com/office/2006/metadata/properties" xmlns:xsi="http://www.w3.org/2001/XMLSchema-instance" xmlns:pc="http://schemas.microsoft.com/office/infopath/2007/PartnerControls">
-  <documentManagement/>
-</p:properties>
-</file>
-
 <file path=customXml/itemProps1.xml><?xml version="1.0" encoding="utf-8"?>
 <ds:datastoreItem xmlns:ds="http://schemas.openxmlformats.org/officeDocument/2006/customXml" ds:itemID="{788A8AF5-6005-42B8-9390-76AF2D70382B}">
   <ds:schemaRefs>
@@ -20390,6 +20588,22 @@
 </file>
 
 <file path=customXml/itemProps2.xml><?xml version="1.0" encoding="utf-8"?>
+<ds:datastoreItem xmlns:ds="http://schemas.openxmlformats.org/officeDocument/2006/customXml" ds:itemID="{C9AD7C4E-BA28-4BF5-9FA0-ADBD3510DAA2}">
+  <ds:schemaRefs>
+    <ds:schemaRef ds:uri="http://schemas.openxmlformats.org/package/2006/metadata/core-properties"/>
+    <ds:schemaRef ds:uri="http://purl.org/dc/terms/"/>
+    <ds:schemaRef ds:uri="http://purl.org/dc/dcmitype/"/>
+    <ds:schemaRef ds:uri="http://schemas.microsoft.com/office/2006/metadata/properties"/>
+    <ds:schemaRef ds:uri="d9c5c803-e33e-4c61-8351-da4c9b99ae39"/>
+    <ds:schemaRef ds:uri="http://schemas.microsoft.com/office/infopath/2007/PartnerControls"/>
+    <ds:schemaRef ds:uri="http://schemas.microsoft.com/office/2006/documentManagement/types"/>
+    <ds:schemaRef ds:uri="http://www.w3.org/XML/1998/namespace"/>
+    <ds:schemaRef ds:uri="http://purl.org/dc/elements/1.1/"/>
+  </ds:schemaRefs>
+</ds:datastoreItem>
+</file>
+
+<file path=customXml/itemProps3.xml><?xml version="1.0" encoding="utf-8"?>
 <ds:datastoreItem xmlns:ds="http://schemas.openxmlformats.org/officeDocument/2006/customXml" ds:itemID="{860A12EA-1FBB-4771-8A81-B60441D360B1}">
   <ds:schemaRefs>
     <ds:schemaRef ds:uri="http://schemas.microsoft.com/office/2006/metadata/contentType"/>
@@ -20405,20 +20619,4 @@
     <ds:schemaRef ds:uri="http://schemas.microsoft.com/internal/obd"/>
   </ds:schemaRefs>
 </ds:datastoreItem>
-</file>
-
-<file path=customXml/itemProps3.xml><?xml version="1.0" encoding="utf-8"?>
-<ds:datastoreItem xmlns:ds="http://schemas.openxmlformats.org/officeDocument/2006/customXml" ds:itemID="{C9AD7C4E-BA28-4BF5-9FA0-ADBD3510DAA2}">
-  <ds:schemaRefs>
-    <ds:schemaRef ds:uri="http://schemas.openxmlformats.org/package/2006/metadata/core-properties"/>
-    <ds:schemaRef ds:uri="http://purl.org/dc/terms/"/>
-    <ds:schemaRef ds:uri="http://purl.org/dc/dcmitype/"/>
-    <ds:schemaRef ds:uri="http://schemas.microsoft.com/office/2006/metadata/properties"/>
-    <ds:schemaRef ds:uri="d9c5c803-e33e-4c61-8351-da4c9b99ae39"/>
-    <ds:schemaRef ds:uri="http://schemas.microsoft.com/office/infopath/2007/PartnerControls"/>
-    <ds:schemaRef ds:uri="http://schemas.microsoft.com/office/2006/documentManagement/types"/>
-    <ds:schemaRef ds:uri="http://www.w3.org/XML/1998/namespace"/>
-    <ds:schemaRef ds:uri="http://purl.org/dc/elements/1.1/"/>
-  </ds:schemaRefs>
-</ds:datastoreItem>
 </file>
</xml_diff>

<commit_message>
All Test related content added
</commit_message>
<xml_diff>
--- a/Unit 3-4 Definitions.pptx
+++ b/Unit 3-4 Definitions.pptx
@@ -5,7 +5,7 @@
     <p:sldMasterId id="2147483648" r:id="rId4"/>
   </p:sldMasterIdLst>
   <p:notesMasterIdLst>
-    <p:notesMasterId r:id="rId35"/>
+    <p:notesMasterId r:id="rId38"/>
   </p:notesMasterIdLst>
   <p:sldIdLst>
     <p:sldId id="256" r:id="rId5"/>
@@ -38,6 +38,9 @@
     <p:sldId id="280" r:id="rId32"/>
     <p:sldId id="294" r:id="rId33"/>
     <p:sldId id="291" r:id="rId34"/>
+    <p:sldId id="296" r:id="rId35"/>
+    <p:sldId id="298" r:id="rId36"/>
+    <p:sldId id="299" r:id="rId37"/>
   </p:sldIdLst>
   <p:sldSz cx="12192000" cy="6858000"/>
   <p:notesSz cx="6858000" cy="9144000"/>
@@ -159,7 +162,7 @@
 <file path=ppt/revisionInfo.xml><?xml version="1.0" encoding="utf-8"?>
 <p1510:revInfo xmlns:a="http://schemas.openxmlformats.org/drawingml/2006/main" xmlns:r="http://schemas.openxmlformats.org/officeDocument/2006/relationships" xmlns:p1510="http://schemas.microsoft.com/office/powerpoint/2015/10/main">
   <p1510:revLst>
-    <p1510:client id="{36668F78-20BC-4003-801C-8ACC5A4B6E0B}" v="55" dt="2021-03-21T23:37:49.914"/>
+    <p1510:client id="{36668F78-20BC-4003-801C-8ACC5A4B6E0B}" v="56" dt="2021-03-29T00:20:14.058"/>
   </p1510:revLst>
 </p1510:revInfo>
 </file>
@@ -169,7 +172,7 @@
   <pc:docChgLst>
     <pc:chgData name="Chen, Jeff" userId="9a3224f5-9893-4468-acd0-6d03119f890b" providerId="ADAL" clId="{36668F78-20BC-4003-801C-8ACC5A4B6E0B}"/>
     <pc:docChg chg="undo custSel addSld delSld modSld">
-      <pc:chgData name="Chen, Jeff" userId="9a3224f5-9893-4468-acd0-6d03119f890b" providerId="ADAL" clId="{36668F78-20BC-4003-801C-8ACC5A4B6E0B}" dt="2021-03-21T23:38:02.781" v="1663" actId="2696"/>
+      <pc:chgData name="Chen, Jeff" userId="9a3224f5-9893-4468-acd0-6d03119f890b" providerId="ADAL" clId="{36668F78-20BC-4003-801C-8ACC5A4B6E0B}" dt="2021-03-29T00:24:44.795" v="1775" actId="2696"/>
       <pc:docMkLst>
         <pc:docMk/>
       </pc:docMkLst>
@@ -1873,6 +1876,144 @@
           </ac:picMkLst>
         </pc:picChg>
       </pc:sldChg>
+      <pc:sldChg chg="addSp modSp new del mod">
+        <pc:chgData name="Chen, Jeff" userId="9a3224f5-9893-4468-acd0-6d03119f890b" providerId="ADAL" clId="{36668F78-20BC-4003-801C-8ACC5A4B6E0B}" dt="2021-03-29T00:24:44.795" v="1775" actId="2696"/>
+        <pc:sldMkLst>
+          <pc:docMk/>
+          <pc:sldMk cId="3693404105" sldId="295"/>
+        </pc:sldMkLst>
+        <pc:spChg chg="mod">
+          <ac:chgData name="Chen, Jeff" userId="9a3224f5-9893-4468-acd0-6d03119f890b" providerId="ADAL" clId="{36668F78-20BC-4003-801C-8ACC5A4B6E0B}" dt="2021-03-29T00:19:49.754" v="1696" actId="20577"/>
+          <ac:spMkLst>
+            <pc:docMk/>
+            <pc:sldMk cId="3693404105" sldId="295"/>
+            <ac:spMk id="2" creationId="{6DBA35D1-0317-4AC4-B267-6634D2ACD124}"/>
+          </ac:spMkLst>
+        </pc:spChg>
+        <pc:picChg chg="add">
+          <ac:chgData name="Chen, Jeff" userId="9a3224f5-9893-4468-acd0-6d03119f890b" providerId="ADAL" clId="{36668F78-20BC-4003-801C-8ACC5A4B6E0B}" dt="2021-03-29T00:19:36.372" v="1665" actId="22"/>
+          <ac:picMkLst>
+            <pc:docMk/>
+            <pc:sldMk cId="3693404105" sldId="295"/>
+            <ac:picMk id="4" creationId="{7BC1B73C-CC81-414C-94B6-6E3E2FCEFD7D}"/>
+          </ac:picMkLst>
+        </pc:picChg>
+      </pc:sldChg>
+      <pc:sldChg chg="addSp delSp modSp add mod">
+        <pc:chgData name="Chen, Jeff" userId="9a3224f5-9893-4468-acd0-6d03119f890b" providerId="ADAL" clId="{36668F78-20BC-4003-801C-8ACC5A4B6E0B}" dt="2021-03-29T00:20:16.945" v="1731" actId="1076"/>
+        <pc:sldMkLst>
+          <pc:docMk/>
+          <pc:sldMk cId="4080796444" sldId="296"/>
+        </pc:sldMkLst>
+        <pc:spChg chg="mod">
+          <ac:chgData name="Chen, Jeff" userId="9a3224f5-9893-4468-acd0-6d03119f890b" providerId="ADAL" clId="{36668F78-20BC-4003-801C-8ACC5A4B6E0B}" dt="2021-03-29T00:20:09.326" v="1728" actId="20577"/>
+          <ac:spMkLst>
+            <pc:docMk/>
+            <pc:sldMk cId="4080796444" sldId="296"/>
+            <ac:spMk id="2" creationId="{7B1A4F75-5C31-4B64-8DB0-EB84145DC97A}"/>
+          </ac:spMkLst>
+        </pc:spChg>
+        <pc:picChg chg="del">
+          <ac:chgData name="Chen, Jeff" userId="9a3224f5-9893-4468-acd0-6d03119f890b" providerId="ADAL" clId="{36668F78-20BC-4003-801C-8ACC5A4B6E0B}" dt="2021-03-29T00:20:11.223" v="1729" actId="478"/>
+          <ac:picMkLst>
+            <pc:docMk/>
+            <pc:sldMk cId="4080796444" sldId="296"/>
+            <ac:picMk id="4" creationId="{58535C4F-9E18-47DC-A559-1AF53A981F4B}"/>
+          </ac:picMkLst>
+        </pc:picChg>
+        <pc:picChg chg="add mod">
+          <ac:chgData name="Chen, Jeff" userId="9a3224f5-9893-4468-acd0-6d03119f890b" providerId="ADAL" clId="{36668F78-20BC-4003-801C-8ACC5A4B6E0B}" dt="2021-03-29T00:20:16.945" v="1731" actId="1076"/>
+          <ac:picMkLst>
+            <pc:docMk/>
+            <pc:sldMk cId="4080796444" sldId="296"/>
+            <ac:picMk id="8" creationId="{589B4206-59A5-4CB9-A1E5-DE56607BBAD2}"/>
+          </ac:picMkLst>
+        </pc:picChg>
+      </pc:sldChg>
+      <pc:sldChg chg="modSp new del mod">
+        <pc:chgData name="Chen, Jeff" userId="9a3224f5-9893-4468-acd0-6d03119f890b" providerId="ADAL" clId="{36668F78-20BC-4003-801C-8ACC5A4B6E0B}" dt="2021-03-29T00:24:42.523" v="1774" actId="2696"/>
+        <pc:sldMkLst>
+          <pc:docMk/>
+          <pc:sldMk cId="3145158326" sldId="297"/>
+        </pc:sldMkLst>
+        <pc:spChg chg="mod">
+          <ac:chgData name="Chen, Jeff" userId="9a3224f5-9893-4468-acd0-6d03119f890b" providerId="ADAL" clId="{36668F78-20BC-4003-801C-8ACC5A4B6E0B}" dt="2021-03-29T00:21:14.826" v="1750" actId="20577"/>
+          <ac:spMkLst>
+            <pc:docMk/>
+            <pc:sldMk cId="3145158326" sldId="297"/>
+            <ac:spMk id="2" creationId="{F17003AB-2102-4D4F-8CF6-5777AD395CCD}"/>
+          </ac:spMkLst>
+        </pc:spChg>
+      </pc:sldChg>
+      <pc:sldChg chg="addSp delSp modSp add mod">
+        <pc:chgData name="Chen, Jeff" userId="9a3224f5-9893-4468-acd0-6d03119f890b" providerId="ADAL" clId="{36668F78-20BC-4003-801C-8ACC5A4B6E0B}" dt="2021-03-29T00:20:50.941" v="1744" actId="20577"/>
+        <pc:sldMkLst>
+          <pc:docMk/>
+          <pc:sldMk cId="1377409982" sldId="298"/>
+        </pc:sldMkLst>
+        <pc:spChg chg="mod">
+          <ac:chgData name="Chen, Jeff" userId="9a3224f5-9893-4468-acd0-6d03119f890b" providerId="ADAL" clId="{36668F78-20BC-4003-801C-8ACC5A4B6E0B}" dt="2021-03-29T00:20:50.941" v="1744" actId="20577"/>
+          <ac:spMkLst>
+            <pc:docMk/>
+            <pc:sldMk cId="1377409982" sldId="298"/>
+            <ac:spMk id="2" creationId="{7B1A4F75-5C31-4B64-8DB0-EB84145DC97A}"/>
+          </ac:spMkLst>
+        </pc:spChg>
+        <pc:picChg chg="add">
+          <ac:chgData name="Chen, Jeff" userId="9a3224f5-9893-4468-acd0-6d03119f890b" providerId="ADAL" clId="{36668F78-20BC-4003-801C-8ACC5A4B6E0B}" dt="2021-03-29T00:20:45.477" v="1735" actId="22"/>
+          <ac:picMkLst>
+            <pc:docMk/>
+            <pc:sldMk cId="1377409982" sldId="298"/>
+            <ac:picMk id="4" creationId="{78EAB12B-FB05-49CA-807A-FC579BACD1CA}"/>
+          </ac:picMkLst>
+        </pc:picChg>
+        <pc:picChg chg="del">
+          <ac:chgData name="Chen, Jeff" userId="9a3224f5-9893-4468-acd0-6d03119f890b" providerId="ADAL" clId="{36668F78-20BC-4003-801C-8ACC5A4B6E0B}" dt="2021-03-29T00:20:45.304" v="1734" actId="478"/>
+          <ac:picMkLst>
+            <pc:docMk/>
+            <pc:sldMk cId="1377409982" sldId="298"/>
+            <ac:picMk id="8" creationId="{589B4206-59A5-4CB9-A1E5-DE56607BBAD2}"/>
+          </ac:picMkLst>
+        </pc:picChg>
+      </pc:sldChg>
+      <pc:sldChg chg="addSp modSp add mod">
+        <pc:chgData name="Chen, Jeff" userId="9a3224f5-9893-4468-acd0-6d03119f890b" providerId="ADAL" clId="{36668F78-20BC-4003-801C-8ACC5A4B6E0B}" dt="2021-03-29T00:22:30.927" v="1771" actId="1076"/>
+        <pc:sldMkLst>
+          <pc:docMk/>
+          <pc:sldMk cId="4042150361" sldId="299"/>
+        </pc:sldMkLst>
+        <pc:spChg chg="mod">
+          <ac:chgData name="Chen, Jeff" userId="9a3224f5-9893-4468-acd0-6d03119f890b" providerId="ADAL" clId="{36668F78-20BC-4003-801C-8ACC5A4B6E0B}" dt="2021-03-29T00:21:24.075" v="1769" actId="20577"/>
+          <ac:spMkLst>
+            <pc:docMk/>
+            <pc:sldMk cId="4042150361" sldId="299"/>
+            <ac:spMk id="2" creationId="{7B1A4F75-5C31-4B64-8DB0-EB84145DC97A}"/>
+          </ac:spMkLst>
+        </pc:spChg>
+        <pc:picChg chg="add">
+          <ac:chgData name="Chen, Jeff" userId="9a3224f5-9893-4468-acd0-6d03119f890b" providerId="ADAL" clId="{36668F78-20BC-4003-801C-8ACC5A4B6E0B}" dt="2021-03-29T00:21:18.548" v="1752" actId="22"/>
+          <ac:picMkLst>
+            <pc:docMk/>
+            <pc:sldMk cId="4042150361" sldId="299"/>
+            <ac:picMk id="5" creationId="{3F05D8F5-1E93-4B0B-9B9C-E32A8FA3E741}"/>
+          </ac:picMkLst>
+        </pc:picChg>
+        <pc:picChg chg="add mod">
+          <ac:chgData name="Chen, Jeff" userId="9a3224f5-9893-4468-acd0-6d03119f890b" providerId="ADAL" clId="{36668F78-20BC-4003-801C-8ACC5A4B6E0B}" dt="2021-03-29T00:22:30.927" v="1771" actId="1076"/>
+          <ac:picMkLst>
+            <pc:docMk/>
+            <pc:sldMk cId="4042150361" sldId="299"/>
+            <ac:picMk id="7" creationId="{4CC44700-9BCB-4BC6-96FA-415DAE95E341}"/>
+          </ac:picMkLst>
+        </pc:picChg>
+      </pc:sldChg>
+      <pc:sldChg chg="new del">
+        <pc:chgData name="Chen, Jeff" userId="9a3224f5-9893-4468-acd0-6d03119f890b" providerId="ADAL" clId="{36668F78-20BC-4003-801C-8ACC5A4B6E0B}" dt="2021-03-29T00:24:39.547" v="1773" actId="2696"/>
+        <pc:sldMkLst>
+          <pc:docMk/>
+          <pc:sldMk cId="353569507" sldId="300"/>
+        </pc:sldMkLst>
+      </pc:sldChg>
     </pc:docChg>
   </pc:docChgLst>
 </pc:chgInfo>
@@ -1960,7 +2101,7 @@
           <a:p>
             <a:fld id="{64FCA671-C320-437E-A846-70FE3A79CD3C}" type="datetimeFigureOut">
               <a:rPr lang="en-US" smtClean="0"/>
-              <a:t>3/21/2021</a:t>
+              <a:t>3/28/2021</a:t>
             </a:fld>
             <a:endParaRPr lang="en-US"/>
           </a:p>
@@ -2374,7 +2515,7 @@
           <a:p>
             <a:fld id="{30D69E17-F306-4E08-9522-67EEF85B89F0}" type="datetimeFigureOut">
               <a:rPr lang="en-US" smtClean="0"/>
-              <a:t>3/21/2021</a:t>
+              <a:t>3/28/2021</a:t>
             </a:fld>
             <a:endParaRPr lang="en-US"/>
           </a:p>
@@ -2572,7 +2713,7 @@
           <a:p>
             <a:fld id="{30D69E17-F306-4E08-9522-67EEF85B89F0}" type="datetimeFigureOut">
               <a:rPr lang="en-US" smtClean="0"/>
-              <a:t>3/21/2021</a:t>
+              <a:t>3/28/2021</a:t>
             </a:fld>
             <a:endParaRPr lang="en-US"/>
           </a:p>
@@ -2780,7 +2921,7 @@
           <a:p>
             <a:fld id="{30D69E17-F306-4E08-9522-67EEF85B89F0}" type="datetimeFigureOut">
               <a:rPr lang="en-US" smtClean="0"/>
-              <a:t>3/21/2021</a:t>
+              <a:t>3/28/2021</a:t>
             </a:fld>
             <a:endParaRPr lang="en-US"/>
           </a:p>
@@ -2978,7 +3119,7 @@
           <a:p>
             <a:fld id="{30D69E17-F306-4E08-9522-67EEF85B89F0}" type="datetimeFigureOut">
               <a:rPr lang="en-US" smtClean="0"/>
-              <a:t>3/21/2021</a:t>
+              <a:t>3/28/2021</a:t>
             </a:fld>
             <a:endParaRPr lang="en-US"/>
           </a:p>
@@ -3253,7 +3394,7 @@
           <a:p>
             <a:fld id="{30D69E17-F306-4E08-9522-67EEF85B89F0}" type="datetimeFigureOut">
               <a:rPr lang="en-US" smtClean="0"/>
-              <a:t>3/21/2021</a:t>
+              <a:t>3/28/2021</a:t>
             </a:fld>
             <a:endParaRPr lang="en-US"/>
           </a:p>
@@ -3518,7 +3659,7 @@
           <a:p>
             <a:fld id="{30D69E17-F306-4E08-9522-67EEF85B89F0}" type="datetimeFigureOut">
               <a:rPr lang="en-US" smtClean="0"/>
-              <a:t>3/21/2021</a:t>
+              <a:t>3/28/2021</a:t>
             </a:fld>
             <a:endParaRPr lang="en-US"/>
           </a:p>
@@ -3930,7 +4071,7 @@
           <a:p>
             <a:fld id="{30D69E17-F306-4E08-9522-67EEF85B89F0}" type="datetimeFigureOut">
               <a:rPr lang="en-US" smtClean="0"/>
-              <a:t>3/21/2021</a:t>
+              <a:t>3/28/2021</a:t>
             </a:fld>
             <a:endParaRPr lang="en-US"/>
           </a:p>
@@ -4071,7 +4212,7 @@
           <a:p>
             <a:fld id="{30D69E17-F306-4E08-9522-67EEF85B89F0}" type="datetimeFigureOut">
               <a:rPr lang="en-US" smtClean="0"/>
-              <a:t>3/21/2021</a:t>
+              <a:t>3/28/2021</a:t>
             </a:fld>
             <a:endParaRPr lang="en-US"/>
           </a:p>
@@ -4184,7 +4325,7 @@
           <a:p>
             <a:fld id="{30D69E17-F306-4E08-9522-67EEF85B89F0}" type="datetimeFigureOut">
               <a:rPr lang="en-US" smtClean="0"/>
-              <a:t>3/21/2021</a:t>
+              <a:t>3/28/2021</a:t>
             </a:fld>
             <a:endParaRPr lang="en-US"/>
           </a:p>
@@ -4495,7 +4636,7 @@
           <a:p>
             <a:fld id="{30D69E17-F306-4E08-9522-67EEF85B89F0}" type="datetimeFigureOut">
               <a:rPr lang="en-US" smtClean="0"/>
-              <a:t>3/21/2021</a:t>
+              <a:t>3/28/2021</a:t>
             </a:fld>
             <a:endParaRPr lang="en-US"/>
           </a:p>
@@ -4783,7 +4924,7 @@
           <a:p>
             <a:fld id="{30D69E17-F306-4E08-9522-67EEF85B89F0}" type="datetimeFigureOut">
               <a:rPr lang="en-US" smtClean="0"/>
-              <a:t>3/21/2021</a:t>
+              <a:t>3/28/2021</a:t>
             </a:fld>
             <a:endParaRPr lang="en-US"/>
           </a:p>
@@ -5024,7 +5165,7 @@
           <a:p>
             <a:fld id="{30D69E17-F306-4E08-9522-67EEF85B89F0}" type="datetimeFigureOut">
               <a:rPr lang="en-US" smtClean="0"/>
-              <a:t>3/21/2021</a:t>
+              <a:t>3/28/2021</a:t>
             </a:fld>
             <a:endParaRPr lang="en-US"/>
           </a:p>
@@ -16962,6 +17103,1089 @@
     <p:extLst>
       <p:ext uri="{BB962C8B-B14F-4D97-AF65-F5344CB8AC3E}">
         <p14:creationId xmlns:p14="http://schemas.microsoft.com/office/powerpoint/2010/main" val="1873168933"/>
+      </p:ext>
+    </p:extLst>
+  </p:cSld>
+  <p:clrMapOvr>
+    <a:masterClrMapping/>
+  </p:clrMapOvr>
+</p:sld>
+</file>
+
+<file path=ppt/slides/slide31.xml><?xml version="1.0" encoding="utf-8"?>
+<p:sld xmlns:a="http://schemas.openxmlformats.org/drawingml/2006/main" xmlns:r="http://schemas.openxmlformats.org/officeDocument/2006/relationships" xmlns:p="http://schemas.openxmlformats.org/presentationml/2006/main">
+  <p:cSld>
+    <p:bg>
+      <p:bgPr>
+        <a:solidFill>
+          <a:schemeClr val="bg1"/>
+        </a:solidFill>
+        <a:effectLst/>
+      </p:bgPr>
+    </p:bg>
+    <p:spTree>
+      <p:nvGrpSpPr>
+        <p:cNvPr id="1" name=""/>
+        <p:cNvGrpSpPr/>
+        <p:nvPr/>
+      </p:nvGrpSpPr>
+      <p:grpSpPr>
+        <a:xfrm>
+          <a:off x="0" y="0"/>
+          <a:ext cx="0" cy="0"/>
+          <a:chOff x="0" y="0"/>
+          <a:chExt cx="0" cy="0"/>
+        </a:xfrm>
+      </p:grpSpPr>
+      <p:cxnSp>
+        <p:nvCxnSpPr>
+          <p:cNvPr id="14" name="Straight Connector 8">
+            <a:extLst>
+              <a:ext uri="{FF2B5EF4-FFF2-40B4-BE49-F238E27FC236}">
+                <a16:creationId xmlns:a16="http://schemas.microsoft.com/office/drawing/2014/main" id="{D2E961F1-4A28-4A5F-BBD4-6E400E5E6C75}"/>
+              </a:ext>
+              <a:ext uri="{C183D7F6-B498-43B3-948B-1728B52AA6E4}">
+                <adec:decorative xmlns:adec="http://schemas.microsoft.com/office/drawing/2017/decorative" val="1"/>
+              </a:ext>
+            </a:extLst>
+          </p:cNvPr>
+          <p:cNvCxnSpPr>
+            <a:cxnSpLocks noGrp="1" noRot="1" noChangeAspect="1" noMove="1" noResize="1" noEditPoints="1" noAdjustHandles="1" noChangeArrowheads="1" noChangeShapeType="1"/>
+          </p:cNvCxnSpPr>
+          <p:nvPr>
+            <p:extLst>
+              <p:ext uri="{386F3935-93C4-4BCD-93E2-E3B085C9AB24}">
+                <p16:designElem xmlns:p16="http://schemas.microsoft.com/office/powerpoint/2015/main" val="1"/>
+              </p:ext>
+            </p:extLst>
+          </p:nvPr>
+        </p:nvCxnSpPr>
+        <p:spPr bwMode="white">
+          <a:xfrm>
+            <a:off x="0" y="272357"/>
+            <a:ext cx="12188824" cy="0"/>
+          </a:xfrm>
+          <a:prstGeom prst="line">
+            <a:avLst/>
+          </a:prstGeom>
+          <a:ln w="50800">
+            <a:solidFill>
+              <a:schemeClr val="tx1">
+                <a:lumMod val="75000"/>
+                <a:lumOff val="25000"/>
+              </a:schemeClr>
+            </a:solidFill>
+          </a:ln>
+        </p:spPr>
+        <p:style>
+          <a:lnRef idx="1">
+            <a:schemeClr val="accent1"/>
+          </a:lnRef>
+          <a:fillRef idx="0">
+            <a:schemeClr val="accent1"/>
+          </a:fillRef>
+          <a:effectRef idx="0">
+            <a:schemeClr val="accent1"/>
+          </a:effectRef>
+          <a:fontRef idx="minor">
+            <a:schemeClr val="tx1"/>
+          </a:fontRef>
+        </p:style>
+      </p:cxnSp>
+      <p:sp>
+        <p:nvSpPr>
+          <p:cNvPr id="16" name="Rectangle 10">
+            <a:extLst>
+              <a:ext uri="{FF2B5EF4-FFF2-40B4-BE49-F238E27FC236}">
+                <a16:creationId xmlns:a16="http://schemas.microsoft.com/office/drawing/2014/main" id="{7F57BEA8-497D-4AA8-8A18-BDCD696B25FE}"/>
+              </a:ext>
+              <a:ext uri="{C183D7F6-B498-43B3-948B-1728B52AA6E4}">
+                <adec:decorative xmlns:adec="http://schemas.microsoft.com/office/drawing/2017/decorative" val="1"/>
+              </a:ext>
+            </a:extLst>
+          </p:cNvPr>
+          <p:cNvSpPr>
+            <a:spLocks noGrp="1" noRot="1" noChangeAspect="1" noMove="1" noResize="1" noEditPoints="1" noAdjustHandles="1" noChangeArrowheads="1" noChangeShapeType="1" noTextEdit="1"/>
+          </p:cNvSpPr>
+          <p:nvPr>
+            <p:extLst>
+              <p:ext uri="{386F3935-93C4-4BCD-93E2-E3B085C9AB24}">
+                <p16:designElem xmlns:p16="http://schemas.microsoft.com/office/powerpoint/2015/main" val="1"/>
+              </p:ext>
+            </p:extLst>
+          </p:nvPr>
+        </p:nvSpPr>
+        <p:spPr>
+          <a:xfrm>
+            <a:off x="0" y="368596"/>
+            <a:ext cx="12192000" cy="1735555"/>
+          </a:xfrm>
+          <a:prstGeom prst="rect">
+            <a:avLst/>
+          </a:prstGeom>
+          <a:solidFill>
+            <a:schemeClr val="tx1">
+              <a:lumMod val="75000"/>
+              <a:lumOff val="25000"/>
+            </a:schemeClr>
+          </a:solidFill>
+          <a:ln>
+            <a:noFill/>
+          </a:ln>
+        </p:spPr>
+        <p:style>
+          <a:lnRef idx="2">
+            <a:schemeClr val="accent1">
+              <a:shade val="50000"/>
+            </a:schemeClr>
+          </a:lnRef>
+          <a:fillRef idx="1">
+            <a:schemeClr val="accent1"/>
+          </a:fillRef>
+          <a:effectRef idx="0">
+            <a:schemeClr val="accent1"/>
+          </a:effectRef>
+          <a:fontRef idx="minor">
+            <a:schemeClr val="lt1"/>
+          </a:fontRef>
+        </p:style>
+        <p:txBody>
+          <a:bodyPr rtlCol="0" anchor="ctr"/>
+          <a:lstStyle/>
+          <a:p>
+            <a:pPr algn="ctr"/>
+            <a:endParaRPr lang="en-US"/>
+          </a:p>
+        </p:txBody>
+      </p:sp>
+      <p:sp>
+        <p:nvSpPr>
+          <p:cNvPr id="2" name="Title 1">
+            <a:extLst>
+              <a:ext uri="{FF2B5EF4-FFF2-40B4-BE49-F238E27FC236}">
+                <a16:creationId xmlns:a16="http://schemas.microsoft.com/office/drawing/2014/main" id="{7B1A4F75-5C31-4B64-8DB0-EB84145DC97A}"/>
+              </a:ext>
+            </a:extLst>
+          </p:cNvPr>
+          <p:cNvSpPr>
+            <a:spLocks noGrp="1"/>
+          </p:cNvSpPr>
+          <p:nvPr>
+            <p:ph type="title"/>
+          </p:nvPr>
+        </p:nvSpPr>
+        <p:spPr>
+          <a:xfrm>
+            <a:off x="526073" y="489439"/>
+            <a:ext cx="11139854" cy="930447"/>
+          </a:xfrm>
+        </p:spPr>
+        <p:txBody>
+          <a:bodyPr vert="horz" lIns="91440" tIns="45720" rIns="91440" bIns="45720" rtlCol="0" anchor="b">
+            <a:normAutofit/>
+          </a:bodyPr>
+          <a:lstStyle/>
+          <a:p>
+            <a:pPr algn="ctr"/>
+            <a:r>
+              <a:rPr lang="en-US" sz="5400" kern="1200" dirty="0">
+                <a:solidFill>
+                  <a:schemeClr val="bg1"/>
+                </a:solidFill>
+                <a:latin typeface="+mj-lt"/>
+                <a:ea typeface="+mj-ea"/>
+                <a:cs typeface="+mj-cs"/>
+              </a:rPr>
+              <a:t>Complex and Imaginary Numbers</a:t>
+            </a:r>
+          </a:p>
+        </p:txBody>
+      </p:sp>
+      <p:cxnSp>
+        <p:nvCxnSpPr>
+          <p:cNvPr id="13" name="Straight Connector 12">
+            <a:extLst>
+              <a:ext uri="{FF2B5EF4-FFF2-40B4-BE49-F238E27FC236}">
+                <a16:creationId xmlns:a16="http://schemas.microsoft.com/office/drawing/2014/main" id="{A82415D3-DDE5-4D63-8CB3-23A5EC581B27}"/>
+              </a:ext>
+              <a:ext uri="{C183D7F6-B498-43B3-948B-1728B52AA6E4}">
+                <adec:decorative xmlns:adec="http://schemas.microsoft.com/office/drawing/2017/decorative" val="1"/>
+              </a:ext>
+            </a:extLst>
+          </p:cNvPr>
+          <p:cNvCxnSpPr>
+            <a:cxnSpLocks noGrp="1" noRot="1" noChangeAspect="1" noMove="1" noResize="1" noEditPoints="1" noAdjustHandles="1" noChangeArrowheads="1" noChangeShapeType="1"/>
+          </p:cNvCxnSpPr>
+          <p:nvPr>
+            <p:extLst>
+              <p:ext uri="{386F3935-93C4-4BCD-93E2-E3B085C9AB24}">
+                <p16:designElem xmlns:p16="http://schemas.microsoft.com/office/powerpoint/2015/main" val="1"/>
+              </p:ext>
+            </p:extLst>
+          </p:nvPr>
+        </p:nvCxnSpPr>
+        <p:spPr>
+          <a:xfrm>
+            <a:off x="4724400" y="1479733"/>
+            <a:ext cx="2743200" cy="0"/>
+          </a:xfrm>
+          <a:prstGeom prst="line">
+            <a:avLst/>
+          </a:prstGeom>
+          <a:ln w="19050">
+            <a:solidFill>
+              <a:schemeClr val="bg1">
+                <a:alpha val="75000"/>
+              </a:schemeClr>
+            </a:solidFill>
+          </a:ln>
+        </p:spPr>
+        <p:style>
+          <a:lnRef idx="1">
+            <a:schemeClr val="accent1"/>
+          </a:lnRef>
+          <a:fillRef idx="0">
+            <a:schemeClr val="accent1"/>
+          </a:fillRef>
+          <a:effectRef idx="0">
+            <a:schemeClr val="accent1"/>
+          </a:effectRef>
+          <a:fontRef idx="minor">
+            <a:schemeClr val="tx1"/>
+          </a:fontRef>
+        </p:style>
+      </p:cxnSp>
+      <p:cxnSp>
+        <p:nvCxnSpPr>
+          <p:cNvPr id="15" name="Straight Connector 14">
+            <a:extLst>
+              <a:ext uri="{FF2B5EF4-FFF2-40B4-BE49-F238E27FC236}">
+                <a16:creationId xmlns:a16="http://schemas.microsoft.com/office/drawing/2014/main" id="{AD7193FB-6AE6-4B3B-8F89-56B55DD63B4D}"/>
+              </a:ext>
+              <a:ext uri="{C183D7F6-B498-43B3-948B-1728B52AA6E4}">
+                <adec:decorative xmlns:adec="http://schemas.microsoft.com/office/drawing/2017/decorative" val="1"/>
+              </a:ext>
+            </a:extLst>
+          </p:cNvPr>
+          <p:cNvCxnSpPr>
+            <a:cxnSpLocks noGrp="1" noRot="1" noChangeAspect="1" noMove="1" noResize="1" noEditPoints="1" noAdjustHandles="1" noChangeArrowheads="1" noChangeShapeType="1"/>
+          </p:cNvCxnSpPr>
+          <p:nvPr>
+            <p:extLst>
+              <p:ext uri="{386F3935-93C4-4BCD-93E2-E3B085C9AB24}">
+                <p16:designElem xmlns:p16="http://schemas.microsoft.com/office/powerpoint/2015/main" val="1"/>
+              </p:ext>
+            </p:extLst>
+          </p:nvPr>
+        </p:nvCxnSpPr>
+        <p:spPr bwMode="white">
+          <a:xfrm>
+            <a:off x="0" y="2201402"/>
+            <a:ext cx="12188824" cy="0"/>
+          </a:xfrm>
+          <a:prstGeom prst="line">
+            <a:avLst/>
+          </a:prstGeom>
+          <a:ln w="50800">
+            <a:solidFill>
+              <a:schemeClr val="tx1">
+                <a:lumMod val="75000"/>
+                <a:lumOff val="25000"/>
+              </a:schemeClr>
+            </a:solidFill>
+          </a:ln>
+        </p:spPr>
+        <p:style>
+          <a:lnRef idx="1">
+            <a:schemeClr val="accent1"/>
+          </a:lnRef>
+          <a:fillRef idx="0">
+            <a:schemeClr val="accent1"/>
+          </a:fillRef>
+          <a:effectRef idx="0">
+            <a:schemeClr val="accent1"/>
+          </a:effectRef>
+          <a:fontRef idx="minor">
+            <a:schemeClr val="tx1"/>
+          </a:fontRef>
+        </p:style>
+      </p:cxnSp>
+      <p:pic>
+        <p:nvPicPr>
+          <p:cNvPr id="8" name="Picture 7">
+            <a:extLst>
+              <a:ext uri="{FF2B5EF4-FFF2-40B4-BE49-F238E27FC236}">
+                <a16:creationId xmlns:a16="http://schemas.microsoft.com/office/drawing/2014/main" id="{589B4206-59A5-4CB9-A1E5-DE56607BBAD2}"/>
+              </a:ext>
+            </a:extLst>
+          </p:cNvPr>
+          <p:cNvPicPr>
+            <a:picLocks noChangeAspect="1"/>
+          </p:cNvPicPr>
+          <p:nvPr/>
+        </p:nvPicPr>
+        <p:blipFill>
+          <a:blip r:embed="rId2"/>
+          <a:stretch>
+            <a:fillRect/>
+          </a:stretch>
+        </p:blipFill>
+        <p:spPr>
+          <a:xfrm>
+            <a:off x="1755774" y="2938780"/>
+            <a:ext cx="8677275" cy="1143000"/>
+          </a:xfrm>
+          <a:prstGeom prst="rect">
+            <a:avLst/>
+          </a:prstGeom>
+        </p:spPr>
+      </p:pic>
+    </p:spTree>
+    <p:extLst>
+      <p:ext uri="{BB962C8B-B14F-4D97-AF65-F5344CB8AC3E}">
+        <p14:creationId xmlns:p14="http://schemas.microsoft.com/office/powerpoint/2010/main" val="4080796444"/>
+      </p:ext>
+    </p:extLst>
+  </p:cSld>
+  <p:clrMapOvr>
+    <a:masterClrMapping/>
+  </p:clrMapOvr>
+</p:sld>
+</file>
+
+<file path=ppt/slides/slide32.xml><?xml version="1.0" encoding="utf-8"?>
+<p:sld xmlns:a="http://schemas.openxmlformats.org/drawingml/2006/main" xmlns:r="http://schemas.openxmlformats.org/officeDocument/2006/relationships" xmlns:p="http://schemas.openxmlformats.org/presentationml/2006/main">
+  <p:cSld>
+    <p:bg>
+      <p:bgPr>
+        <a:solidFill>
+          <a:schemeClr val="bg1"/>
+        </a:solidFill>
+        <a:effectLst/>
+      </p:bgPr>
+    </p:bg>
+    <p:spTree>
+      <p:nvGrpSpPr>
+        <p:cNvPr id="1" name=""/>
+        <p:cNvGrpSpPr/>
+        <p:nvPr/>
+      </p:nvGrpSpPr>
+      <p:grpSpPr>
+        <a:xfrm>
+          <a:off x="0" y="0"/>
+          <a:ext cx="0" cy="0"/>
+          <a:chOff x="0" y="0"/>
+          <a:chExt cx="0" cy="0"/>
+        </a:xfrm>
+      </p:grpSpPr>
+      <p:cxnSp>
+        <p:nvCxnSpPr>
+          <p:cNvPr id="14" name="Straight Connector 8">
+            <a:extLst>
+              <a:ext uri="{FF2B5EF4-FFF2-40B4-BE49-F238E27FC236}">
+                <a16:creationId xmlns:a16="http://schemas.microsoft.com/office/drawing/2014/main" id="{D2E961F1-4A28-4A5F-BBD4-6E400E5E6C75}"/>
+              </a:ext>
+              <a:ext uri="{C183D7F6-B498-43B3-948B-1728B52AA6E4}">
+                <adec:decorative xmlns:adec="http://schemas.microsoft.com/office/drawing/2017/decorative" val="1"/>
+              </a:ext>
+            </a:extLst>
+          </p:cNvPr>
+          <p:cNvCxnSpPr>
+            <a:cxnSpLocks noGrp="1" noRot="1" noChangeAspect="1" noMove="1" noResize="1" noEditPoints="1" noAdjustHandles="1" noChangeArrowheads="1" noChangeShapeType="1"/>
+          </p:cNvCxnSpPr>
+          <p:nvPr>
+            <p:extLst>
+              <p:ext uri="{386F3935-93C4-4BCD-93E2-E3B085C9AB24}">
+                <p16:designElem xmlns:p16="http://schemas.microsoft.com/office/powerpoint/2015/main" val="1"/>
+              </p:ext>
+            </p:extLst>
+          </p:nvPr>
+        </p:nvCxnSpPr>
+        <p:spPr bwMode="white">
+          <a:xfrm>
+            <a:off x="0" y="272357"/>
+            <a:ext cx="12188824" cy="0"/>
+          </a:xfrm>
+          <a:prstGeom prst="line">
+            <a:avLst/>
+          </a:prstGeom>
+          <a:ln w="50800">
+            <a:solidFill>
+              <a:schemeClr val="tx1">
+                <a:lumMod val="75000"/>
+                <a:lumOff val="25000"/>
+              </a:schemeClr>
+            </a:solidFill>
+          </a:ln>
+        </p:spPr>
+        <p:style>
+          <a:lnRef idx="1">
+            <a:schemeClr val="accent1"/>
+          </a:lnRef>
+          <a:fillRef idx="0">
+            <a:schemeClr val="accent1"/>
+          </a:fillRef>
+          <a:effectRef idx="0">
+            <a:schemeClr val="accent1"/>
+          </a:effectRef>
+          <a:fontRef idx="minor">
+            <a:schemeClr val="tx1"/>
+          </a:fontRef>
+        </p:style>
+      </p:cxnSp>
+      <p:sp>
+        <p:nvSpPr>
+          <p:cNvPr id="16" name="Rectangle 10">
+            <a:extLst>
+              <a:ext uri="{FF2B5EF4-FFF2-40B4-BE49-F238E27FC236}">
+                <a16:creationId xmlns:a16="http://schemas.microsoft.com/office/drawing/2014/main" id="{7F57BEA8-497D-4AA8-8A18-BDCD696B25FE}"/>
+              </a:ext>
+              <a:ext uri="{C183D7F6-B498-43B3-948B-1728B52AA6E4}">
+                <adec:decorative xmlns:adec="http://schemas.microsoft.com/office/drawing/2017/decorative" val="1"/>
+              </a:ext>
+            </a:extLst>
+          </p:cNvPr>
+          <p:cNvSpPr>
+            <a:spLocks noGrp="1" noRot="1" noChangeAspect="1" noMove="1" noResize="1" noEditPoints="1" noAdjustHandles="1" noChangeArrowheads="1" noChangeShapeType="1" noTextEdit="1"/>
+          </p:cNvSpPr>
+          <p:nvPr>
+            <p:extLst>
+              <p:ext uri="{386F3935-93C4-4BCD-93E2-E3B085C9AB24}">
+                <p16:designElem xmlns:p16="http://schemas.microsoft.com/office/powerpoint/2015/main" val="1"/>
+              </p:ext>
+            </p:extLst>
+          </p:nvPr>
+        </p:nvSpPr>
+        <p:spPr>
+          <a:xfrm>
+            <a:off x="0" y="368596"/>
+            <a:ext cx="12192000" cy="1735555"/>
+          </a:xfrm>
+          <a:prstGeom prst="rect">
+            <a:avLst/>
+          </a:prstGeom>
+          <a:solidFill>
+            <a:schemeClr val="tx1">
+              <a:lumMod val="75000"/>
+              <a:lumOff val="25000"/>
+            </a:schemeClr>
+          </a:solidFill>
+          <a:ln>
+            <a:noFill/>
+          </a:ln>
+        </p:spPr>
+        <p:style>
+          <a:lnRef idx="2">
+            <a:schemeClr val="accent1">
+              <a:shade val="50000"/>
+            </a:schemeClr>
+          </a:lnRef>
+          <a:fillRef idx="1">
+            <a:schemeClr val="accent1"/>
+          </a:fillRef>
+          <a:effectRef idx="0">
+            <a:schemeClr val="accent1"/>
+          </a:effectRef>
+          <a:fontRef idx="minor">
+            <a:schemeClr val="lt1"/>
+          </a:fontRef>
+        </p:style>
+        <p:txBody>
+          <a:bodyPr rtlCol="0" anchor="ctr"/>
+          <a:lstStyle/>
+          <a:p>
+            <a:pPr algn="ctr"/>
+            <a:endParaRPr lang="en-US"/>
+          </a:p>
+        </p:txBody>
+      </p:sp>
+      <p:sp>
+        <p:nvSpPr>
+          <p:cNvPr id="2" name="Title 1">
+            <a:extLst>
+              <a:ext uri="{FF2B5EF4-FFF2-40B4-BE49-F238E27FC236}">
+                <a16:creationId xmlns:a16="http://schemas.microsoft.com/office/drawing/2014/main" id="{7B1A4F75-5C31-4B64-8DB0-EB84145DC97A}"/>
+              </a:ext>
+            </a:extLst>
+          </p:cNvPr>
+          <p:cNvSpPr>
+            <a:spLocks noGrp="1"/>
+          </p:cNvSpPr>
+          <p:nvPr>
+            <p:ph type="title"/>
+          </p:nvPr>
+        </p:nvSpPr>
+        <p:spPr>
+          <a:xfrm>
+            <a:off x="526073" y="489439"/>
+            <a:ext cx="11139854" cy="930447"/>
+          </a:xfrm>
+        </p:spPr>
+        <p:txBody>
+          <a:bodyPr vert="horz" lIns="91440" tIns="45720" rIns="91440" bIns="45720" rtlCol="0" anchor="b">
+            <a:normAutofit/>
+          </a:bodyPr>
+          <a:lstStyle/>
+          <a:p>
+            <a:pPr algn="ctr"/>
+            <a:r>
+              <a:rPr lang="en-US" sz="5400" kern="1200" dirty="0">
+                <a:solidFill>
+                  <a:schemeClr val="bg1"/>
+                </a:solidFill>
+                <a:latin typeface="+mj-lt"/>
+                <a:ea typeface="+mj-ea"/>
+                <a:cs typeface="+mj-cs"/>
+              </a:rPr>
+              <a:t>Complex Conjugate</a:t>
+            </a:r>
+          </a:p>
+        </p:txBody>
+      </p:sp>
+      <p:cxnSp>
+        <p:nvCxnSpPr>
+          <p:cNvPr id="13" name="Straight Connector 12">
+            <a:extLst>
+              <a:ext uri="{FF2B5EF4-FFF2-40B4-BE49-F238E27FC236}">
+                <a16:creationId xmlns:a16="http://schemas.microsoft.com/office/drawing/2014/main" id="{A82415D3-DDE5-4D63-8CB3-23A5EC581B27}"/>
+              </a:ext>
+              <a:ext uri="{C183D7F6-B498-43B3-948B-1728B52AA6E4}">
+                <adec:decorative xmlns:adec="http://schemas.microsoft.com/office/drawing/2017/decorative" val="1"/>
+              </a:ext>
+            </a:extLst>
+          </p:cNvPr>
+          <p:cNvCxnSpPr>
+            <a:cxnSpLocks noGrp="1" noRot="1" noChangeAspect="1" noMove="1" noResize="1" noEditPoints="1" noAdjustHandles="1" noChangeArrowheads="1" noChangeShapeType="1"/>
+          </p:cNvCxnSpPr>
+          <p:nvPr>
+            <p:extLst>
+              <p:ext uri="{386F3935-93C4-4BCD-93E2-E3B085C9AB24}">
+                <p16:designElem xmlns:p16="http://schemas.microsoft.com/office/powerpoint/2015/main" val="1"/>
+              </p:ext>
+            </p:extLst>
+          </p:nvPr>
+        </p:nvCxnSpPr>
+        <p:spPr>
+          <a:xfrm>
+            <a:off x="4724400" y="1479733"/>
+            <a:ext cx="2743200" cy="0"/>
+          </a:xfrm>
+          <a:prstGeom prst="line">
+            <a:avLst/>
+          </a:prstGeom>
+          <a:ln w="19050">
+            <a:solidFill>
+              <a:schemeClr val="bg1">
+                <a:alpha val="75000"/>
+              </a:schemeClr>
+            </a:solidFill>
+          </a:ln>
+        </p:spPr>
+        <p:style>
+          <a:lnRef idx="1">
+            <a:schemeClr val="accent1"/>
+          </a:lnRef>
+          <a:fillRef idx="0">
+            <a:schemeClr val="accent1"/>
+          </a:fillRef>
+          <a:effectRef idx="0">
+            <a:schemeClr val="accent1"/>
+          </a:effectRef>
+          <a:fontRef idx="minor">
+            <a:schemeClr val="tx1"/>
+          </a:fontRef>
+        </p:style>
+      </p:cxnSp>
+      <p:cxnSp>
+        <p:nvCxnSpPr>
+          <p:cNvPr id="15" name="Straight Connector 14">
+            <a:extLst>
+              <a:ext uri="{FF2B5EF4-FFF2-40B4-BE49-F238E27FC236}">
+                <a16:creationId xmlns:a16="http://schemas.microsoft.com/office/drawing/2014/main" id="{AD7193FB-6AE6-4B3B-8F89-56B55DD63B4D}"/>
+              </a:ext>
+              <a:ext uri="{C183D7F6-B498-43B3-948B-1728B52AA6E4}">
+                <adec:decorative xmlns:adec="http://schemas.microsoft.com/office/drawing/2017/decorative" val="1"/>
+              </a:ext>
+            </a:extLst>
+          </p:cNvPr>
+          <p:cNvCxnSpPr>
+            <a:cxnSpLocks noGrp="1" noRot="1" noChangeAspect="1" noMove="1" noResize="1" noEditPoints="1" noAdjustHandles="1" noChangeArrowheads="1" noChangeShapeType="1"/>
+          </p:cNvCxnSpPr>
+          <p:nvPr>
+            <p:extLst>
+              <p:ext uri="{386F3935-93C4-4BCD-93E2-E3B085C9AB24}">
+                <p16:designElem xmlns:p16="http://schemas.microsoft.com/office/powerpoint/2015/main" val="1"/>
+              </p:ext>
+            </p:extLst>
+          </p:nvPr>
+        </p:nvCxnSpPr>
+        <p:spPr bwMode="white">
+          <a:xfrm>
+            <a:off x="0" y="2201402"/>
+            <a:ext cx="12188824" cy="0"/>
+          </a:xfrm>
+          <a:prstGeom prst="line">
+            <a:avLst/>
+          </a:prstGeom>
+          <a:ln w="50800">
+            <a:solidFill>
+              <a:schemeClr val="tx1">
+                <a:lumMod val="75000"/>
+                <a:lumOff val="25000"/>
+              </a:schemeClr>
+            </a:solidFill>
+          </a:ln>
+        </p:spPr>
+        <p:style>
+          <a:lnRef idx="1">
+            <a:schemeClr val="accent1"/>
+          </a:lnRef>
+          <a:fillRef idx="0">
+            <a:schemeClr val="accent1"/>
+          </a:fillRef>
+          <a:effectRef idx="0">
+            <a:schemeClr val="accent1"/>
+          </a:effectRef>
+          <a:fontRef idx="minor">
+            <a:schemeClr val="tx1"/>
+          </a:fontRef>
+        </p:style>
+      </p:cxnSp>
+      <p:pic>
+        <p:nvPicPr>
+          <p:cNvPr id="4" name="Picture 3">
+            <a:extLst>
+              <a:ext uri="{FF2B5EF4-FFF2-40B4-BE49-F238E27FC236}">
+                <a16:creationId xmlns:a16="http://schemas.microsoft.com/office/drawing/2014/main" id="{78EAB12B-FB05-49CA-807A-FC579BACD1CA}"/>
+              </a:ext>
+            </a:extLst>
+          </p:cNvPr>
+          <p:cNvPicPr>
+            <a:picLocks noChangeAspect="1"/>
+          </p:cNvPicPr>
+          <p:nvPr/>
+        </p:nvPicPr>
+        <p:blipFill>
+          <a:blip r:embed="rId2"/>
+          <a:stretch>
+            <a:fillRect/>
+          </a:stretch>
+        </p:blipFill>
+        <p:spPr>
+          <a:xfrm>
+            <a:off x="1671637" y="3086100"/>
+            <a:ext cx="8848725" cy="685800"/>
+          </a:xfrm>
+          <a:prstGeom prst="rect">
+            <a:avLst/>
+          </a:prstGeom>
+        </p:spPr>
+      </p:pic>
+    </p:spTree>
+    <p:extLst>
+      <p:ext uri="{BB962C8B-B14F-4D97-AF65-F5344CB8AC3E}">
+        <p14:creationId xmlns:p14="http://schemas.microsoft.com/office/powerpoint/2010/main" val="1377409982"/>
+      </p:ext>
+    </p:extLst>
+  </p:cSld>
+  <p:clrMapOvr>
+    <a:masterClrMapping/>
+  </p:clrMapOvr>
+</p:sld>
+</file>
+
+<file path=ppt/slides/slide33.xml><?xml version="1.0" encoding="utf-8"?>
+<p:sld xmlns:a="http://schemas.openxmlformats.org/drawingml/2006/main" xmlns:r="http://schemas.openxmlformats.org/officeDocument/2006/relationships" xmlns:p="http://schemas.openxmlformats.org/presentationml/2006/main">
+  <p:cSld>
+    <p:bg>
+      <p:bgPr>
+        <a:solidFill>
+          <a:schemeClr val="bg1"/>
+        </a:solidFill>
+        <a:effectLst/>
+      </p:bgPr>
+    </p:bg>
+    <p:spTree>
+      <p:nvGrpSpPr>
+        <p:cNvPr id="1" name=""/>
+        <p:cNvGrpSpPr/>
+        <p:nvPr/>
+      </p:nvGrpSpPr>
+      <p:grpSpPr>
+        <a:xfrm>
+          <a:off x="0" y="0"/>
+          <a:ext cx="0" cy="0"/>
+          <a:chOff x="0" y="0"/>
+          <a:chExt cx="0" cy="0"/>
+        </a:xfrm>
+      </p:grpSpPr>
+      <p:cxnSp>
+        <p:nvCxnSpPr>
+          <p:cNvPr id="14" name="Straight Connector 8">
+            <a:extLst>
+              <a:ext uri="{FF2B5EF4-FFF2-40B4-BE49-F238E27FC236}">
+                <a16:creationId xmlns:a16="http://schemas.microsoft.com/office/drawing/2014/main" id="{D2E961F1-4A28-4A5F-BBD4-6E400E5E6C75}"/>
+              </a:ext>
+              <a:ext uri="{C183D7F6-B498-43B3-948B-1728B52AA6E4}">
+                <adec:decorative xmlns:adec="http://schemas.microsoft.com/office/drawing/2017/decorative" val="1"/>
+              </a:ext>
+            </a:extLst>
+          </p:cNvPr>
+          <p:cNvCxnSpPr>
+            <a:cxnSpLocks noGrp="1" noRot="1" noChangeAspect="1" noMove="1" noResize="1" noEditPoints="1" noAdjustHandles="1" noChangeArrowheads="1" noChangeShapeType="1"/>
+          </p:cNvCxnSpPr>
+          <p:nvPr>
+            <p:extLst>
+              <p:ext uri="{386F3935-93C4-4BCD-93E2-E3B085C9AB24}">
+                <p16:designElem xmlns:p16="http://schemas.microsoft.com/office/powerpoint/2015/main" val="1"/>
+              </p:ext>
+            </p:extLst>
+          </p:nvPr>
+        </p:nvCxnSpPr>
+        <p:spPr bwMode="white">
+          <a:xfrm>
+            <a:off x="0" y="272357"/>
+            <a:ext cx="12188824" cy="0"/>
+          </a:xfrm>
+          <a:prstGeom prst="line">
+            <a:avLst/>
+          </a:prstGeom>
+          <a:ln w="50800">
+            <a:solidFill>
+              <a:schemeClr val="tx1">
+                <a:lumMod val="75000"/>
+                <a:lumOff val="25000"/>
+              </a:schemeClr>
+            </a:solidFill>
+          </a:ln>
+        </p:spPr>
+        <p:style>
+          <a:lnRef idx="1">
+            <a:schemeClr val="accent1"/>
+          </a:lnRef>
+          <a:fillRef idx="0">
+            <a:schemeClr val="accent1"/>
+          </a:fillRef>
+          <a:effectRef idx="0">
+            <a:schemeClr val="accent1"/>
+          </a:effectRef>
+          <a:fontRef idx="minor">
+            <a:schemeClr val="tx1"/>
+          </a:fontRef>
+        </p:style>
+      </p:cxnSp>
+      <p:sp>
+        <p:nvSpPr>
+          <p:cNvPr id="16" name="Rectangle 10">
+            <a:extLst>
+              <a:ext uri="{FF2B5EF4-FFF2-40B4-BE49-F238E27FC236}">
+                <a16:creationId xmlns:a16="http://schemas.microsoft.com/office/drawing/2014/main" id="{7F57BEA8-497D-4AA8-8A18-BDCD696B25FE}"/>
+              </a:ext>
+              <a:ext uri="{C183D7F6-B498-43B3-948B-1728B52AA6E4}">
+                <adec:decorative xmlns:adec="http://schemas.microsoft.com/office/drawing/2017/decorative" val="1"/>
+              </a:ext>
+            </a:extLst>
+          </p:cNvPr>
+          <p:cNvSpPr>
+            <a:spLocks noGrp="1" noRot="1" noChangeAspect="1" noMove="1" noResize="1" noEditPoints="1" noAdjustHandles="1" noChangeArrowheads="1" noChangeShapeType="1" noTextEdit="1"/>
+          </p:cNvSpPr>
+          <p:nvPr>
+            <p:extLst>
+              <p:ext uri="{386F3935-93C4-4BCD-93E2-E3B085C9AB24}">
+                <p16:designElem xmlns:p16="http://schemas.microsoft.com/office/powerpoint/2015/main" val="1"/>
+              </p:ext>
+            </p:extLst>
+          </p:nvPr>
+        </p:nvSpPr>
+        <p:spPr>
+          <a:xfrm>
+            <a:off x="0" y="368596"/>
+            <a:ext cx="12192000" cy="1735555"/>
+          </a:xfrm>
+          <a:prstGeom prst="rect">
+            <a:avLst/>
+          </a:prstGeom>
+          <a:solidFill>
+            <a:schemeClr val="tx1">
+              <a:lumMod val="75000"/>
+              <a:lumOff val="25000"/>
+            </a:schemeClr>
+          </a:solidFill>
+          <a:ln>
+            <a:noFill/>
+          </a:ln>
+        </p:spPr>
+        <p:style>
+          <a:lnRef idx="2">
+            <a:schemeClr val="accent1">
+              <a:shade val="50000"/>
+            </a:schemeClr>
+          </a:lnRef>
+          <a:fillRef idx="1">
+            <a:schemeClr val="accent1"/>
+          </a:fillRef>
+          <a:effectRef idx="0">
+            <a:schemeClr val="accent1"/>
+          </a:effectRef>
+          <a:fontRef idx="minor">
+            <a:schemeClr val="lt1"/>
+          </a:fontRef>
+        </p:style>
+        <p:txBody>
+          <a:bodyPr rtlCol="0" anchor="ctr"/>
+          <a:lstStyle/>
+          <a:p>
+            <a:pPr algn="ctr"/>
+            <a:endParaRPr lang="en-US"/>
+          </a:p>
+        </p:txBody>
+      </p:sp>
+      <p:sp>
+        <p:nvSpPr>
+          <p:cNvPr id="2" name="Title 1">
+            <a:extLst>
+              <a:ext uri="{FF2B5EF4-FFF2-40B4-BE49-F238E27FC236}">
+                <a16:creationId xmlns:a16="http://schemas.microsoft.com/office/drawing/2014/main" id="{7B1A4F75-5C31-4B64-8DB0-EB84145DC97A}"/>
+              </a:ext>
+            </a:extLst>
+          </p:cNvPr>
+          <p:cNvSpPr>
+            <a:spLocks noGrp="1"/>
+          </p:cNvSpPr>
+          <p:nvPr>
+            <p:ph type="title"/>
+          </p:nvPr>
+        </p:nvSpPr>
+        <p:spPr>
+          <a:xfrm>
+            <a:off x="526073" y="489439"/>
+            <a:ext cx="11139854" cy="930447"/>
+          </a:xfrm>
+        </p:spPr>
+        <p:txBody>
+          <a:bodyPr vert="horz" lIns="91440" tIns="45720" rIns="91440" bIns="45720" rtlCol="0" anchor="b">
+            <a:normAutofit/>
+          </a:bodyPr>
+          <a:lstStyle/>
+          <a:p>
+            <a:pPr algn="ctr"/>
+            <a:r>
+              <a:rPr lang="en-US" sz="5400" kern="1200" dirty="0">
+                <a:solidFill>
+                  <a:schemeClr val="bg1"/>
+                </a:solidFill>
+                <a:latin typeface="+mj-lt"/>
+                <a:ea typeface="+mj-ea"/>
+                <a:cs typeface="+mj-cs"/>
+              </a:rPr>
+              <a:t>Magnitude</a:t>
+            </a:r>
+          </a:p>
+        </p:txBody>
+      </p:sp>
+      <p:cxnSp>
+        <p:nvCxnSpPr>
+          <p:cNvPr id="13" name="Straight Connector 12">
+            <a:extLst>
+              <a:ext uri="{FF2B5EF4-FFF2-40B4-BE49-F238E27FC236}">
+                <a16:creationId xmlns:a16="http://schemas.microsoft.com/office/drawing/2014/main" id="{A82415D3-DDE5-4D63-8CB3-23A5EC581B27}"/>
+              </a:ext>
+              <a:ext uri="{C183D7F6-B498-43B3-948B-1728B52AA6E4}">
+                <adec:decorative xmlns:adec="http://schemas.microsoft.com/office/drawing/2017/decorative" val="1"/>
+              </a:ext>
+            </a:extLst>
+          </p:cNvPr>
+          <p:cNvCxnSpPr>
+            <a:cxnSpLocks noGrp="1" noRot="1" noChangeAspect="1" noMove="1" noResize="1" noEditPoints="1" noAdjustHandles="1" noChangeArrowheads="1" noChangeShapeType="1"/>
+          </p:cNvCxnSpPr>
+          <p:nvPr>
+            <p:extLst>
+              <p:ext uri="{386F3935-93C4-4BCD-93E2-E3B085C9AB24}">
+                <p16:designElem xmlns:p16="http://schemas.microsoft.com/office/powerpoint/2015/main" val="1"/>
+              </p:ext>
+            </p:extLst>
+          </p:nvPr>
+        </p:nvCxnSpPr>
+        <p:spPr>
+          <a:xfrm>
+            <a:off x="4724400" y="1479733"/>
+            <a:ext cx="2743200" cy="0"/>
+          </a:xfrm>
+          <a:prstGeom prst="line">
+            <a:avLst/>
+          </a:prstGeom>
+          <a:ln w="19050">
+            <a:solidFill>
+              <a:schemeClr val="bg1">
+                <a:alpha val="75000"/>
+              </a:schemeClr>
+            </a:solidFill>
+          </a:ln>
+        </p:spPr>
+        <p:style>
+          <a:lnRef idx="1">
+            <a:schemeClr val="accent1"/>
+          </a:lnRef>
+          <a:fillRef idx="0">
+            <a:schemeClr val="accent1"/>
+          </a:fillRef>
+          <a:effectRef idx="0">
+            <a:schemeClr val="accent1"/>
+          </a:effectRef>
+          <a:fontRef idx="minor">
+            <a:schemeClr val="tx1"/>
+          </a:fontRef>
+        </p:style>
+      </p:cxnSp>
+      <p:cxnSp>
+        <p:nvCxnSpPr>
+          <p:cNvPr id="15" name="Straight Connector 14">
+            <a:extLst>
+              <a:ext uri="{FF2B5EF4-FFF2-40B4-BE49-F238E27FC236}">
+                <a16:creationId xmlns:a16="http://schemas.microsoft.com/office/drawing/2014/main" id="{AD7193FB-6AE6-4B3B-8F89-56B55DD63B4D}"/>
+              </a:ext>
+              <a:ext uri="{C183D7F6-B498-43B3-948B-1728B52AA6E4}">
+                <adec:decorative xmlns:adec="http://schemas.microsoft.com/office/drawing/2017/decorative" val="1"/>
+              </a:ext>
+            </a:extLst>
+          </p:cNvPr>
+          <p:cNvCxnSpPr>
+            <a:cxnSpLocks noGrp="1" noRot="1" noChangeAspect="1" noMove="1" noResize="1" noEditPoints="1" noAdjustHandles="1" noChangeArrowheads="1" noChangeShapeType="1"/>
+          </p:cNvCxnSpPr>
+          <p:nvPr>
+            <p:extLst>
+              <p:ext uri="{386F3935-93C4-4BCD-93E2-E3B085C9AB24}">
+                <p16:designElem xmlns:p16="http://schemas.microsoft.com/office/powerpoint/2015/main" val="1"/>
+              </p:ext>
+            </p:extLst>
+          </p:nvPr>
+        </p:nvCxnSpPr>
+        <p:spPr bwMode="white">
+          <a:xfrm>
+            <a:off x="0" y="2201402"/>
+            <a:ext cx="12188824" cy="0"/>
+          </a:xfrm>
+          <a:prstGeom prst="line">
+            <a:avLst/>
+          </a:prstGeom>
+          <a:ln w="50800">
+            <a:solidFill>
+              <a:schemeClr val="tx1">
+                <a:lumMod val="75000"/>
+                <a:lumOff val="25000"/>
+              </a:schemeClr>
+            </a:solidFill>
+          </a:ln>
+        </p:spPr>
+        <p:style>
+          <a:lnRef idx="1">
+            <a:schemeClr val="accent1"/>
+          </a:lnRef>
+          <a:fillRef idx="0">
+            <a:schemeClr val="accent1"/>
+          </a:fillRef>
+          <a:effectRef idx="0">
+            <a:schemeClr val="accent1"/>
+          </a:effectRef>
+          <a:fontRef idx="minor">
+            <a:schemeClr val="tx1"/>
+          </a:fontRef>
+        </p:style>
+      </p:cxnSp>
+      <p:pic>
+        <p:nvPicPr>
+          <p:cNvPr id="4" name="Picture 3">
+            <a:extLst>
+              <a:ext uri="{FF2B5EF4-FFF2-40B4-BE49-F238E27FC236}">
+                <a16:creationId xmlns:a16="http://schemas.microsoft.com/office/drawing/2014/main" id="{78EAB12B-FB05-49CA-807A-FC579BACD1CA}"/>
+              </a:ext>
+            </a:extLst>
+          </p:cNvPr>
+          <p:cNvPicPr>
+            <a:picLocks noChangeAspect="1"/>
+          </p:cNvPicPr>
+          <p:nvPr/>
+        </p:nvPicPr>
+        <p:blipFill>
+          <a:blip r:embed="rId2"/>
+          <a:stretch>
+            <a:fillRect/>
+          </a:stretch>
+        </p:blipFill>
+        <p:spPr>
+          <a:xfrm>
+            <a:off x="1671637" y="3086100"/>
+            <a:ext cx="8848725" cy="685800"/>
+          </a:xfrm>
+          <a:prstGeom prst="rect">
+            <a:avLst/>
+          </a:prstGeom>
+        </p:spPr>
+      </p:pic>
+      <p:pic>
+        <p:nvPicPr>
+          <p:cNvPr id="5" name="Picture 4">
+            <a:extLst>
+              <a:ext uri="{FF2B5EF4-FFF2-40B4-BE49-F238E27FC236}">
+                <a16:creationId xmlns:a16="http://schemas.microsoft.com/office/drawing/2014/main" id="{3F05D8F5-1E93-4B0B-9B9C-E32A8FA3E741}"/>
+              </a:ext>
+            </a:extLst>
+          </p:cNvPr>
+          <p:cNvPicPr>
+            <a:picLocks noChangeAspect="1"/>
+          </p:cNvPicPr>
+          <p:nvPr/>
+        </p:nvPicPr>
+        <p:blipFill>
+          <a:blip r:embed="rId3"/>
+          <a:stretch>
+            <a:fillRect/>
+          </a:stretch>
+        </p:blipFill>
+        <p:spPr>
+          <a:xfrm>
+            <a:off x="1733550" y="3028950"/>
+            <a:ext cx="8724900" cy="800100"/>
+          </a:xfrm>
+          <a:prstGeom prst="rect">
+            <a:avLst/>
+          </a:prstGeom>
+        </p:spPr>
+      </p:pic>
+      <p:pic>
+        <p:nvPicPr>
+          <p:cNvPr id="7" name="Picture 6">
+            <a:extLst>
+              <a:ext uri="{FF2B5EF4-FFF2-40B4-BE49-F238E27FC236}">
+                <a16:creationId xmlns:a16="http://schemas.microsoft.com/office/drawing/2014/main" id="{4CC44700-9BCB-4BC6-96FA-415DAE95E341}"/>
+              </a:ext>
+            </a:extLst>
+          </p:cNvPr>
+          <p:cNvPicPr>
+            <a:picLocks noChangeAspect="1"/>
+          </p:cNvPicPr>
+          <p:nvPr/>
+        </p:nvPicPr>
+        <p:blipFill>
+          <a:blip r:embed="rId4"/>
+          <a:stretch>
+            <a:fillRect/>
+          </a:stretch>
+        </p:blipFill>
+        <p:spPr>
+          <a:xfrm>
+            <a:off x="1781175" y="3771900"/>
+            <a:ext cx="8801100" cy="638175"/>
+          </a:xfrm>
+          <a:prstGeom prst="rect">
+            <a:avLst/>
+          </a:prstGeom>
+        </p:spPr>
+      </p:pic>
+    </p:spTree>
+    <p:extLst>
+      <p:ext uri="{BB962C8B-B14F-4D97-AF65-F5344CB8AC3E}">
+        <p14:creationId xmlns:p14="http://schemas.microsoft.com/office/powerpoint/2010/main" val="4042150361"/>
       </p:ext>
     </p:extLst>
   </p:cSld>
@@ -20419,18 +21643,18 @@
 </file>
 
 <file path=customXml/item1.xml><?xml version="1.0" encoding="utf-8"?>
+<p:properties xmlns:p="http://schemas.microsoft.com/office/2006/metadata/properties" xmlns:xsi="http://www.w3.org/2001/XMLSchema-instance" xmlns:pc="http://schemas.microsoft.com/office/infopath/2007/PartnerControls">
+  <documentManagement/>
+</p:properties>
+</file>
+
+<file path=customXml/item2.xml><?xml version="1.0" encoding="utf-8"?>
 <?mso-contentType ?>
 <FormTemplates xmlns="http://schemas.microsoft.com/sharepoint/v3/contenttype/forms">
   <Display>DocumentLibraryForm</Display>
   <Edit>DocumentLibraryForm</Edit>
   <New>DocumentLibraryForm</New>
 </FormTemplates>
-</file>
-
-<file path=customXml/item2.xml><?xml version="1.0" encoding="utf-8"?>
-<p:properties xmlns:p="http://schemas.microsoft.com/office/2006/metadata/properties" xmlns:xsi="http://www.w3.org/2001/XMLSchema-instance" xmlns:pc="http://schemas.microsoft.com/office/infopath/2007/PartnerControls">
-  <documentManagement/>
-</p:properties>
 </file>
 
 <file path=customXml/item3.xml><?xml version="1.0" encoding="utf-8"?>
@@ -20580,14 +21804,6 @@
 </file>
 
 <file path=customXml/itemProps1.xml><?xml version="1.0" encoding="utf-8"?>
-<ds:datastoreItem xmlns:ds="http://schemas.openxmlformats.org/officeDocument/2006/customXml" ds:itemID="{788A8AF5-6005-42B8-9390-76AF2D70382B}">
-  <ds:schemaRefs>
-    <ds:schemaRef ds:uri="http://schemas.microsoft.com/sharepoint/v3/contenttype/forms"/>
-  </ds:schemaRefs>
-</ds:datastoreItem>
-</file>
-
-<file path=customXml/itemProps2.xml><?xml version="1.0" encoding="utf-8"?>
 <ds:datastoreItem xmlns:ds="http://schemas.openxmlformats.org/officeDocument/2006/customXml" ds:itemID="{C9AD7C4E-BA28-4BF5-9FA0-ADBD3510DAA2}">
   <ds:schemaRefs>
     <ds:schemaRef ds:uri="http://schemas.openxmlformats.org/package/2006/metadata/core-properties"/>
@@ -20599,6 +21815,14 @@
     <ds:schemaRef ds:uri="http://schemas.microsoft.com/office/2006/documentManagement/types"/>
     <ds:schemaRef ds:uri="http://www.w3.org/XML/1998/namespace"/>
     <ds:schemaRef ds:uri="http://purl.org/dc/elements/1.1/"/>
+  </ds:schemaRefs>
+</ds:datastoreItem>
+</file>
+
+<file path=customXml/itemProps2.xml><?xml version="1.0" encoding="utf-8"?>
+<ds:datastoreItem xmlns:ds="http://schemas.openxmlformats.org/officeDocument/2006/customXml" ds:itemID="{788A8AF5-6005-42B8-9390-76AF2D70382B}">
+  <ds:schemaRefs>
+    <ds:schemaRef ds:uri="http://schemas.microsoft.com/sharepoint/v3/contenttype/forms"/>
   </ds:schemaRefs>
 </ds:datastoreItem>
 </file>

</xml_diff>